<commit_message>
added Motivation and Experiment Setup to the presentation
</commit_message>
<xml_diff>
--- a/presentation.pptx
+++ b/presentation.pptx
@@ -665,6 +665,277 @@
 </p:notesMaster>
 </file>
 
+<file path=ppt/notesSlides/notesSlide1.xml><?xml version="1.0" encoding="utf-8"?>
+<p:notes xmlns:a="http://schemas.openxmlformats.org/drawingml/2006/main" xmlns:r="http://schemas.openxmlformats.org/officeDocument/2006/relationships" xmlns:p="http://schemas.openxmlformats.org/presentationml/2006/main">
+  <p:cSld>
+    <p:spTree>
+      <p:nvGrpSpPr>
+        <p:cNvPr id="1" name=""/>
+        <p:cNvGrpSpPr/>
+        <p:nvPr/>
+      </p:nvGrpSpPr>
+      <p:grpSpPr>
+        <a:xfrm>
+          <a:off x="0" y="0"/>
+          <a:ext cx="0" cy="0"/>
+          <a:chOff x="0" y="0"/>
+          <a:chExt cx="0" cy="0"/>
+        </a:xfrm>
+      </p:grpSpPr>
+      <p:sp>
+        <p:nvSpPr>
+          <p:cNvPr id="2" name="Slide Image Placeholder 1"/>
+          <p:cNvSpPr>
+            <a:spLocks noGrp="1" noRot="1" noChangeAspect="1"/>
+          </p:cNvSpPr>
+          <p:nvPr>
+            <p:ph type="sldImg"/>
+          </p:nvPr>
+        </p:nvSpPr>
+        <p:spPr/>
+      </p:sp>
+      <p:sp>
+        <p:nvSpPr>
+          <p:cNvPr id="3" name="Notes Placeholder 2"/>
+          <p:cNvSpPr>
+            <a:spLocks noGrp="1"/>
+          </p:cNvSpPr>
+          <p:nvPr>
+            <p:ph type="body" idx="1"/>
+          </p:nvPr>
+        </p:nvSpPr>
+        <p:spPr/>
+        <p:txBody>
+          <a:bodyPr/>
+          <a:lstStyle/>
+          <a:p>
+            <a:r>
+              <a:rPr lang="en-GB" dirty="0"/>
+              <a:t>Traffic is annoying for everyone involved.</a:t>
+            </a:r>
+          </a:p>
+          <a:p>
+            <a:r>
+              <a:rPr lang="en-GB" dirty="0"/>
+              <a:t>Example Graz Glacis at rush-hour.</a:t>
+            </a:r>
+          </a:p>
+          <a:p>
+            <a:endParaRPr lang="en-GB" dirty="0"/>
+          </a:p>
+          <a:p>
+            <a:r>
+              <a:rPr lang="en-GB" dirty="0"/>
+              <a:t>Plan-&gt; Expand current existing road network</a:t>
+            </a:r>
+          </a:p>
+          <a:p>
+            <a:pPr marL="285750" indent="-285750">
+              <a:buFont typeface="Wingdings" panose="05000000000000000000" pitchFamily="2" charset="2"/>
+              <a:buChar char="è"/>
+            </a:pPr>
+            <a:r>
+              <a:rPr lang="en-GB" dirty="0"/>
+              <a:t>Create big highway </a:t>
+            </a:r>
+            <a:r>
+              <a:rPr lang="en-GB" dirty="0" err="1"/>
+              <a:t>f.e</a:t>
+            </a:r>
+            <a:r>
+              <a:rPr lang="en-GB" dirty="0"/>
+              <a:t>. through the city</a:t>
+            </a:r>
+          </a:p>
+          <a:p>
+            <a:pPr marL="285750" indent="-285750">
+              <a:buFont typeface="Wingdings" panose="05000000000000000000" pitchFamily="2" charset="2"/>
+              <a:buChar char="è"/>
+            </a:pPr>
+            <a:r>
+              <a:rPr lang="en-GB" dirty="0"/>
+              <a:t>Where would it be placed to maximize throughput</a:t>
+            </a:r>
+          </a:p>
+          <a:p>
+            <a:pPr marL="0" indent="0">
+              <a:buFont typeface="Wingdings" panose="05000000000000000000" pitchFamily="2" charset="2"/>
+              <a:buNone/>
+            </a:pPr>
+            <a:r>
+              <a:rPr lang="en-GB" dirty="0"/>
+              <a:t>Most likely not realistic to put a highway through the city centre</a:t>
+            </a:r>
+          </a:p>
+          <a:p>
+            <a:pPr marL="285750" indent="-285750">
+              <a:buFont typeface="Wingdings" panose="05000000000000000000" pitchFamily="2" charset="2"/>
+              <a:buChar char="è"/>
+            </a:pPr>
+            <a:r>
+              <a:rPr lang="en-GB" dirty="0"/>
+              <a:t>Maybe we get a result like the </a:t>
+            </a:r>
+            <a:r>
+              <a:rPr lang="en-GB" dirty="0" err="1"/>
+              <a:t>Plabutsch</a:t>
+            </a:r>
+            <a:r>
+              <a:rPr lang="en-GB" dirty="0"/>
+              <a:t> tunnel for Graz (lifesaver)</a:t>
+            </a:r>
+          </a:p>
+          <a:p>
+            <a:pPr marL="0" indent="0">
+              <a:buFont typeface="Wingdings" panose="05000000000000000000" pitchFamily="2" charset="2"/>
+              <a:buNone/>
+            </a:pPr>
+            <a:endParaRPr lang="en-GB" dirty="0"/>
+          </a:p>
+          <a:p>
+            <a:endParaRPr lang="en-AT" dirty="0"/>
+          </a:p>
+        </p:txBody>
+      </p:sp>
+      <p:sp>
+        <p:nvSpPr>
+          <p:cNvPr id="4" name="Slide Number Placeholder 3"/>
+          <p:cNvSpPr>
+            <a:spLocks noGrp="1"/>
+          </p:cNvSpPr>
+          <p:nvPr>
+            <p:ph type="sldNum" sz="quarter" idx="5"/>
+          </p:nvPr>
+        </p:nvSpPr>
+        <p:spPr/>
+        <p:txBody>
+          <a:bodyPr/>
+          <a:lstStyle/>
+          <a:p>
+            <a:fld id="{5DACABA8-235B-9747-A3D2-12573A6AFA9D}" type="slidenum">
+              <a:rPr lang="de-DE" smtClean="0"/>
+              <a:t>2</a:t>
+            </a:fld>
+            <a:endParaRPr lang="de-DE"/>
+          </a:p>
+        </p:txBody>
+      </p:sp>
+    </p:spTree>
+    <p:extLst>
+      <p:ext uri="{BB962C8B-B14F-4D97-AF65-F5344CB8AC3E}">
+        <p14:creationId xmlns:p14="http://schemas.microsoft.com/office/powerpoint/2010/main" val="1515686237"/>
+      </p:ext>
+    </p:extLst>
+  </p:cSld>
+  <p:clrMapOvr>
+    <a:masterClrMapping/>
+  </p:clrMapOvr>
+</p:notes>
+</file>
+
+<file path=ppt/notesSlides/notesSlide2.xml><?xml version="1.0" encoding="utf-8"?>
+<p:notes xmlns:a="http://schemas.openxmlformats.org/drawingml/2006/main" xmlns:r="http://schemas.openxmlformats.org/officeDocument/2006/relationships" xmlns:p="http://schemas.openxmlformats.org/presentationml/2006/main">
+  <p:cSld>
+    <p:spTree>
+      <p:nvGrpSpPr>
+        <p:cNvPr id="1" name=""/>
+        <p:cNvGrpSpPr/>
+        <p:nvPr/>
+      </p:nvGrpSpPr>
+      <p:grpSpPr>
+        <a:xfrm>
+          <a:off x="0" y="0"/>
+          <a:ext cx="0" cy="0"/>
+          <a:chOff x="0" y="0"/>
+          <a:chExt cx="0" cy="0"/>
+        </a:xfrm>
+      </p:grpSpPr>
+      <p:sp>
+        <p:nvSpPr>
+          <p:cNvPr id="2" name="Slide Image Placeholder 1"/>
+          <p:cNvSpPr>
+            <a:spLocks noGrp="1" noRot="1" noChangeAspect="1"/>
+          </p:cNvSpPr>
+          <p:nvPr>
+            <p:ph type="sldImg"/>
+          </p:nvPr>
+        </p:nvSpPr>
+        <p:spPr/>
+      </p:sp>
+      <p:sp>
+        <p:nvSpPr>
+          <p:cNvPr id="3" name="Notes Placeholder 2"/>
+          <p:cNvSpPr>
+            <a:spLocks noGrp="1"/>
+          </p:cNvSpPr>
+          <p:nvPr>
+            <p:ph type="body" idx="1"/>
+          </p:nvPr>
+        </p:nvSpPr>
+        <p:spPr/>
+        <p:txBody>
+          <a:bodyPr/>
+          <a:lstStyle/>
+          <a:p>
+            <a:r>
+              <a:rPr lang="en-GB" dirty="0"/>
+              <a:t>Inhabitants Oldenburg 2005 158k, 2019 168k</a:t>
+            </a:r>
+          </a:p>
+          <a:p>
+            <a:r>
+              <a:rPr lang="en-GB" dirty="0"/>
+              <a:t>Inhabitants Salzburg 2017 152k</a:t>
+            </a:r>
+          </a:p>
+          <a:p>
+            <a:endParaRPr lang="en-GB" dirty="0"/>
+          </a:p>
+          <a:p>
+            <a:r>
+              <a:rPr lang="en-GB" dirty="0"/>
+              <a:t>https://users.cs.utah.edu/~lifeifei/SpatialDataset.htm</a:t>
+            </a:r>
+            <a:endParaRPr lang="en-AT" dirty="0"/>
+          </a:p>
+        </p:txBody>
+      </p:sp>
+      <p:sp>
+        <p:nvSpPr>
+          <p:cNvPr id="4" name="Slide Number Placeholder 3"/>
+          <p:cNvSpPr>
+            <a:spLocks noGrp="1"/>
+          </p:cNvSpPr>
+          <p:nvPr>
+            <p:ph type="sldNum" sz="quarter" idx="5"/>
+          </p:nvPr>
+        </p:nvSpPr>
+        <p:spPr/>
+        <p:txBody>
+          <a:bodyPr/>
+          <a:lstStyle/>
+          <a:p>
+            <a:fld id="{5DACABA8-235B-9747-A3D2-12573A6AFA9D}" type="slidenum">
+              <a:rPr lang="de-DE" smtClean="0"/>
+              <a:t>3</a:t>
+            </a:fld>
+            <a:endParaRPr lang="de-DE"/>
+          </a:p>
+        </p:txBody>
+      </p:sp>
+    </p:spTree>
+    <p:extLst>
+      <p:ext uri="{BB962C8B-B14F-4D97-AF65-F5344CB8AC3E}">
+        <p14:creationId xmlns:p14="http://schemas.microsoft.com/office/powerpoint/2010/main" val="1307268794"/>
+      </p:ext>
+    </p:extLst>
+  </p:cSld>
+  <p:clrMapOvr>
+    <a:masterClrMapping/>
+  </p:clrMapOvr>
+</p:notes>
+</file>
+
 <file path=ppt/slideLayouts/slideLayout1.xml><?xml version="1.0" encoding="utf-8"?>
 <p:sldLayout xmlns:a="http://schemas.openxmlformats.org/drawingml/2006/main" xmlns:r="http://schemas.openxmlformats.org/officeDocument/2006/relationships" xmlns:p="http://schemas.openxmlformats.org/presentationml/2006/main" showMasterSp="0" preserve="1" userDrawn="1">
   <p:cSld name="Cover Slide">
@@ -879,14 +1150,14 @@
           </a:ln>
           <a:extLst>
             <a:ext uri="{909E8E84-426E-40dd-AFC4-6F175D3DCCD1}">
-              <a14:hiddenFill xmlns="" xmlns:a14="http://schemas.microsoft.com/office/drawing/2010/main">
+              <a14:hiddenFill xmlns:a14="http://schemas.microsoft.com/office/drawing/2010/main" xmlns="">
                 <a:solidFill>
                   <a:srgbClr val="FFFFFF"/>
                 </a:solidFill>
               </a14:hiddenFill>
             </a:ext>
             <a:ext uri="{91240B29-F687-4f45-9708-019B960494DF}">
-              <a14:hiddenLine xmlns="" xmlns:a14="http://schemas.microsoft.com/office/drawing/2010/main" w="9525">
+              <a14:hiddenLine xmlns:a14="http://schemas.microsoft.com/office/drawing/2010/main" xmlns="" w="9525">
                 <a:solidFill>
                   <a:srgbClr val="000000"/>
                 </a:solidFill>
@@ -2178,6 +2449,130 @@
           </a:p>
         </p:txBody>
       </p:sp>
+      <p:sp>
+        <p:nvSpPr>
+          <p:cNvPr id="3" name="TextBox 2">
+            <a:extLst>
+              <a:ext uri="{FF2B5EF4-FFF2-40B4-BE49-F238E27FC236}">
+                <a16:creationId xmlns:a16="http://schemas.microsoft.com/office/drawing/2014/main" id="{239F63D5-E3CC-020E-79AE-E5A37A06BAC3}"/>
+              </a:ext>
+            </a:extLst>
+          </p:cNvPr>
+          <p:cNvSpPr txBox="1"/>
+          <p:nvPr/>
+        </p:nvSpPr>
+        <p:spPr>
+          <a:xfrm>
+            <a:off x="1377108" y="1591671"/>
+            <a:ext cx="10653311" cy="3170099"/>
+          </a:xfrm>
+          <a:prstGeom prst="rect">
+            <a:avLst/>
+          </a:prstGeom>
+          <a:noFill/>
+        </p:spPr>
+        <p:txBody>
+          <a:bodyPr wrap="square" lIns="0" rtlCol="0">
+            <a:spAutoFit/>
+          </a:bodyPr>
+          <a:lstStyle/>
+          <a:p>
+            <a:pPr marL="342900" indent="-342900">
+              <a:buFont typeface="Arial" panose="020B0604020202020204" pitchFamily="34" charset="0"/>
+              <a:buChar char="•"/>
+            </a:pPr>
+            <a:r>
+              <a:rPr lang="en-GB" sz="2000" dirty="0"/>
+              <a:t>Simulate traffic congestion in an urban area</a:t>
+            </a:r>
+          </a:p>
+          <a:p>
+            <a:pPr marL="990981" lvl="1" indent="-342900">
+              <a:buFont typeface="Arial" panose="020B0604020202020204" pitchFamily="34" charset="0"/>
+              <a:buChar char="•"/>
+            </a:pPr>
+            <a:r>
+              <a:rPr lang="en-GB" sz="2000" dirty="0"/>
+              <a:t>Predominately in smaller city</a:t>
+            </a:r>
+          </a:p>
+          <a:p>
+            <a:pPr marL="990981" lvl="1" indent="-342900">
+              <a:buFont typeface="Arial" panose="020B0604020202020204" pitchFamily="34" charset="0"/>
+              <a:buChar char="•"/>
+            </a:pPr>
+            <a:endParaRPr lang="en-GB" sz="2000" dirty="0"/>
+          </a:p>
+          <a:p>
+            <a:pPr marL="342900" indent="-342900">
+              <a:buFont typeface="Arial" panose="020B0604020202020204" pitchFamily="34" charset="0"/>
+              <a:buChar char="•"/>
+            </a:pPr>
+            <a:r>
+              <a:rPr lang="en-GB" sz="2000" dirty="0"/>
+              <a:t>Simulate a possible improvement to the traffic problem</a:t>
+            </a:r>
+          </a:p>
+          <a:p>
+            <a:pPr marL="990981" lvl="1" indent="-342900">
+              <a:buFont typeface="Arial" panose="020B0604020202020204" pitchFamily="34" charset="0"/>
+              <a:buChar char="•"/>
+            </a:pPr>
+            <a:r>
+              <a:rPr lang="en-GB" sz="2000" dirty="0"/>
+              <a:t>Expansion of already existing roads</a:t>
+            </a:r>
+          </a:p>
+          <a:p>
+            <a:pPr marL="990981" lvl="1" indent="-342900">
+              <a:buFont typeface="Arial" panose="020B0604020202020204" pitchFamily="34" charset="0"/>
+              <a:buChar char="•"/>
+            </a:pPr>
+            <a:endParaRPr lang="en-GB" sz="2000" dirty="0"/>
+          </a:p>
+          <a:p>
+            <a:pPr marL="342900" indent="-342900">
+              <a:buFont typeface="Arial" panose="020B0604020202020204" pitchFamily="34" charset="0"/>
+              <a:buChar char="•"/>
+            </a:pPr>
+            <a:r>
+              <a:rPr lang="en-GB" sz="2000" dirty="0"/>
+              <a:t>Potential benefit of improved infrastructure</a:t>
+            </a:r>
+          </a:p>
+          <a:p>
+            <a:pPr marL="990981" lvl="1" indent="-342900">
+              <a:buFont typeface="Arial" panose="020B0604020202020204" pitchFamily="34" charset="0"/>
+              <a:buChar char="•"/>
+            </a:pPr>
+            <a:r>
+              <a:rPr lang="en-GB" sz="2000" dirty="0"/>
+              <a:t>Less travel time</a:t>
+            </a:r>
+          </a:p>
+          <a:p>
+            <a:pPr marL="990981" lvl="1" indent="-342900">
+              <a:buFont typeface="Arial" panose="020B0604020202020204" pitchFamily="34" charset="0"/>
+              <a:buChar char="•"/>
+            </a:pPr>
+            <a:r>
+              <a:rPr lang="en-GB" sz="2000" dirty="0"/>
+              <a:t>Enhanced transportation network</a:t>
+            </a:r>
+          </a:p>
+          <a:p>
+            <a:pPr marL="990981" lvl="1" indent="-342900">
+              <a:buFont typeface="Arial" panose="020B0604020202020204" pitchFamily="34" charset="0"/>
+              <a:buChar char="•"/>
+            </a:pPr>
+            <a:r>
+              <a:rPr lang="en-GB" sz="2000" dirty="0"/>
+              <a:t>Positive Influence on the city's development</a:t>
+            </a:r>
+            <a:endParaRPr lang="en-AT" sz="2000" dirty="0" err="1"/>
+          </a:p>
+        </p:txBody>
+      </p:sp>
     </p:spTree>
     <p:extLst>
       <p:ext uri="{BB962C8B-B14F-4D97-AF65-F5344CB8AC3E}">
@@ -2281,7 +2676,7 @@
           <p:nvPr/>
         </p:nvPicPr>
         <p:blipFill rotWithShape="1">
-          <a:blip r:embed="rId2"/>
+          <a:blip r:embed="rId3"/>
           <a:srcRect l="11263" t="8571" r="9347" b="8346"/>
           <a:stretch/>
         </p:blipFill>
@@ -2310,7 +2705,7 @@
           <p:nvPr/>
         </p:nvPicPr>
         <p:blipFill rotWithShape="1">
-          <a:blip r:embed="rId2"/>
+          <a:blip r:embed="rId3"/>
           <a:srcRect l="18567" t="17412" r="15978" b="16596"/>
           <a:stretch/>
         </p:blipFill>
@@ -2324,6 +2719,160 @@
           </a:prstGeom>
         </p:spPr>
       </p:pic>
+      <p:sp>
+        <p:nvSpPr>
+          <p:cNvPr id="3" name="TextBox 2">
+            <a:extLst>
+              <a:ext uri="{FF2B5EF4-FFF2-40B4-BE49-F238E27FC236}">
+                <a16:creationId xmlns:a16="http://schemas.microsoft.com/office/drawing/2014/main" id="{78685FFE-A86F-D1EB-B5C6-CE25AF8225E0}"/>
+              </a:ext>
+            </a:extLst>
+          </p:cNvPr>
+          <p:cNvSpPr txBox="1"/>
+          <p:nvPr/>
+        </p:nvSpPr>
+        <p:spPr>
+          <a:xfrm>
+            <a:off x="1255923" y="1591671"/>
+            <a:ext cx="6290631" cy="5016758"/>
+          </a:xfrm>
+          <a:prstGeom prst="rect">
+            <a:avLst/>
+          </a:prstGeom>
+          <a:noFill/>
+        </p:spPr>
+        <p:txBody>
+          <a:bodyPr wrap="square" lIns="0" rtlCol="0">
+            <a:spAutoFit/>
+          </a:bodyPr>
+          <a:lstStyle/>
+          <a:p>
+            <a:pPr marL="342900" indent="-342900">
+              <a:buFont typeface="Arial" panose="020B0604020202020204" pitchFamily="34" charset="0"/>
+              <a:buChar char="•"/>
+            </a:pPr>
+            <a:r>
+              <a:rPr lang="en-GB" sz="2000" dirty="0"/>
+              <a:t>City of Oldenburg (2005) </a:t>
+            </a:r>
+          </a:p>
+          <a:p>
+            <a:pPr marL="990981" lvl="1" indent="-342900">
+              <a:buFont typeface="Arial" panose="020B0604020202020204" pitchFamily="34" charset="0"/>
+              <a:buChar char="•"/>
+            </a:pPr>
+            <a:r>
+              <a:rPr lang="en-GB" sz="2000" dirty="0"/>
+              <a:t>6105 Nodes (Crossings)</a:t>
+            </a:r>
+          </a:p>
+          <a:p>
+            <a:pPr marL="990981" lvl="1" indent="-342900">
+              <a:buFont typeface="Arial" panose="020B0604020202020204" pitchFamily="34" charset="0"/>
+              <a:buChar char="•"/>
+            </a:pPr>
+            <a:r>
+              <a:rPr lang="en-GB" sz="2000" dirty="0"/>
+              <a:t>7029 Edges (Roads)</a:t>
+            </a:r>
+          </a:p>
+          <a:p>
+            <a:pPr marL="990981" lvl="1" indent="-342900">
+              <a:buFont typeface="Arial" panose="020B0604020202020204" pitchFamily="34" charset="0"/>
+              <a:buChar char="•"/>
+            </a:pPr>
+            <a:r>
+              <a:rPr lang="en-GB" sz="2000" dirty="0"/>
+              <a:t>About the size (inhabitants) of Salzburg</a:t>
+            </a:r>
+          </a:p>
+          <a:p>
+            <a:pPr marL="990981" lvl="1" indent="-342900">
+              <a:buFont typeface="Arial" panose="020B0604020202020204" pitchFamily="34" charset="0"/>
+              <a:buChar char="•"/>
+            </a:pPr>
+            <a:endParaRPr lang="en-GB" sz="2000" dirty="0"/>
+          </a:p>
+          <a:p>
+            <a:pPr marL="342900" indent="-342900">
+              <a:buFont typeface="Arial" panose="020B0604020202020204" pitchFamily="34" charset="0"/>
+              <a:buChar char="•"/>
+            </a:pPr>
+            <a:r>
+              <a:rPr lang="en-GB" sz="2000" dirty="0"/>
+              <a:t>Agent based simulation</a:t>
+            </a:r>
+          </a:p>
+          <a:p>
+            <a:pPr marL="342900" indent="-342900">
+              <a:buFont typeface="Arial" panose="020B0604020202020204" pitchFamily="34" charset="0"/>
+              <a:buChar char="•"/>
+            </a:pPr>
+            <a:endParaRPr lang="en-GB" sz="2000" dirty="0"/>
+          </a:p>
+          <a:p>
+            <a:pPr marL="342900" indent="-342900">
+              <a:buFont typeface="Arial" panose="020B0604020202020204" pitchFamily="34" charset="0"/>
+              <a:buChar char="•"/>
+            </a:pPr>
+            <a:r>
+              <a:rPr lang="en-GB" sz="2000" dirty="0"/>
+              <a:t>Baseline analysis on the unmodified dataset</a:t>
+            </a:r>
+          </a:p>
+          <a:p>
+            <a:pPr marL="990981" lvl="1" indent="-342900">
+              <a:buFont typeface="Arial" panose="020B0604020202020204" pitchFamily="34" charset="0"/>
+              <a:buChar char="•"/>
+            </a:pPr>
+            <a:r>
+              <a:rPr lang="en-GB" sz="2000" dirty="0"/>
+              <a:t>Identify bottlenecks</a:t>
+            </a:r>
+          </a:p>
+          <a:p>
+            <a:pPr marL="990981" lvl="1" indent="-342900">
+              <a:buFont typeface="Arial" panose="020B0604020202020204" pitchFamily="34" charset="0"/>
+              <a:buChar char="•"/>
+            </a:pPr>
+            <a:r>
+              <a:rPr lang="en-GB" sz="2000" dirty="0"/>
+              <a:t>Determine which roads to expand</a:t>
+            </a:r>
+          </a:p>
+          <a:p>
+            <a:pPr marL="990981" lvl="1" indent="-342900">
+              <a:buFont typeface="Arial" panose="020B0604020202020204" pitchFamily="34" charset="0"/>
+              <a:buChar char="•"/>
+            </a:pPr>
+            <a:endParaRPr lang="en-GB" sz="2000" dirty="0"/>
+          </a:p>
+          <a:p>
+            <a:pPr marL="342900" indent="-342900">
+              <a:buFont typeface="Arial" panose="020B0604020202020204" pitchFamily="34" charset="0"/>
+              <a:buChar char="•"/>
+            </a:pPr>
+            <a:r>
+              <a:rPr lang="en-GB" sz="2000" dirty="0"/>
+              <a:t>Determine if the efficiency has been improved with the expansion of the road to a highway</a:t>
+            </a:r>
+          </a:p>
+          <a:p>
+            <a:endParaRPr lang="en-GB" sz="2000" dirty="0"/>
+          </a:p>
+          <a:p>
+            <a:pPr lvl="1"/>
+            <a:endParaRPr lang="en-GB" sz="2000" dirty="0"/>
+          </a:p>
+          <a:p>
+            <a:pPr marL="990981" lvl="1" indent="-342900">
+              <a:buFont typeface="Arial" panose="020B0604020202020204" pitchFamily="34" charset="0"/>
+              <a:buChar char="•"/>
+            </a:pPr>
+            <a:endParaRPr lang="en-GB" sz="2000" dirty="0"/>
+          </a:p>
+        </p:txBody>
+      </p:sp>
     </p:spTree>
     <p:extLst>
       <p:ext uri="{BB962C8B-B14F-4D97-AF65-F5344CB8AC3E}">

</xml_diff>

<commit_message>
format presentation, extend methodology
</commit_message>
<xml_diff>
--- a/presentation.pptx
+++ b/presentation.pptx
@@ -5,20 +5,19 @@
     <p:sldMasterId id="2147483648" r:id="rId1"/>
   </p:sldMasterIdLst>
   <p:notesMasterIdLst>
-    <p:notesMasterId r:id="rId10"/>
+    <p:notesMasterId r:id="rId9"/>
   </p:notesMasterIdLst>
   <p:handoutMasterIdLst>
-    <p:handoutMasterId r:id="rId11"/>
+    <p:handoutMasterId r:id="rId10"/>
   </p:handoutMasterIdLst>
   <p:sldIdLst>
     <p:sldId id="266" r:id="rId2"/>
     <p:sldId id="413" r:id="rId3"/>
     <p:sldId id="420" r:id="rId4"/>
     <p:sldId id="424" r:id="rId5"/>
-    <p:sldId id="419" r:id="rId6"/>
-    <p:sldId id="421" r:id="rId7"/>
-    <p:sldId id="423" r:id="rId8"/>
-    <p:sldId id="422" r:id="rId9"/>
+    <p:sldId id="421" r:id="rId6"/>
+    <p:sldId id="423" r:id="rId7"/>
+    <p:sldId id="422" r:id="rId8"/>
   </p:sldIdLst>
   <p:sldSz cx="12938125" cy="7315200"/>
   <p:notesSz cx="6858000" cy="9144000"/>
@@ -294,7 +293,7 @@
           <a:p>
             <a:fld id="{250C9E9C-1806-3D45-8625-F0002340C4C2}" type="slidenum">
               <a:rPr lang="de-DE" smtClean="0"/>
-              <a:t>‹#›</a:t>
+              <a:t>‹Nr.›</a:t>
             </a:fld>
             <a:endParaRPr lang="de-DE"/>
           </a:p>
@@ -553,7 +552,7 @@
           <a:p>
             <a:fld id="{5DACABA8-235B-9747-A3D2-12573A6AFA9D}" type="slidenum">
               <a:rPr lang="de-DE" smtClean="0"/>
-              <a:t>‹#›</a:t>
+              <a:t>‹Nr.›</a:t>
             </a:fld>
             <a:endParaRPr lang="de-DE"/>
           </a:p>
@@ -1148,14 +1147,14 @@
           </a:ln>
           <a:extLst>
             <a:ext uri="{909E8E84-426E-40dd-AFC4-6F175D3DCCD1}">
-              <a14:hiddenFill xmlns="" xmlns:a14="http://schemas.microsoft.com/office/drawing/2010/main">
+              <a14:hiddenFill xmlns:a14="http://schemas.microsoft.com/office/drawing/2010/main" xmlns="">
                 <a:solidFill>
                   <a:srgbClr val="FFFFFF"/>
                 </a:solidFill>
               </a14:hiddenFill>
             </a:ext>
             <a:ext uri="{91240B29-F687-4f45-9708-019B960494DF}">
-              <a14:hiddenLine xmlns="" xmlns:a14="http://schemas.microsoft.com/office/drawing/2010/main" w="9525">
+              <a14:hiddenLine xmlns:a14="http://schemas.microsoft.com/office/drawing/2010/main" xmlns="" w="9525">
                 <a:solidFill>
                   <a:srgbClr val="000000"/>
                 </a:solidFill>
@@ -1439,7 +1438,7 @@
           <a:p>
             <a:fld id="{4B64EC4D-37E3-EF42-B9AB-6337577588CB}" type="slidenum">
               <a:rPr lang="de-DE" smtClean="0"/>
-              <a:t>‹#›</a:t>
+              <a:t>‹Nr.›</a:t>
             </a:fld>
             <a:endParaRPr lang="de-DE"/>
           </a:p>
@@ -1811,7 +1810,7 @@
             <a:fld id="{4B64EC4D-37E3-EF42-B9AB-6337577588CB}" type="slidenum">
               <a:rPr lang="de-DE" smtClean="0"/>
               <a:pPr/>
-              <a:t>‹#›</a:t>
+              <a:t>‹Nr.›</a:t>
             </a:fld>
             <a:endParaRPr lang="de-DE" dirty="0"/>
           </a:p>
@@ -2205,13 +2204,13 @@
   <p:clrMapOvr>
     <a:masterClrMapping/>
   </p:clrMapOvr>
-  <mc:AlternateContent xmlns:mc="http://schemas.openxmlformats.org/markup-compatibility/2006">
-    <mc:Choice xmlns:p159="http://schemas.microsoft.com/office/powerpoint/2015/09/main" Requires="p159">
+  <mc:AlternateContent xmlns:mc="http://schemas.openxmlformats.org/markup-compatibility/2006" xmlns:p159="http://schemas.microsoft.com/office/powerpoint/2015/09/main">
+    <mc:Choice Requires="p159">
       <p:transition xmlns:p14="http://schemas.microsoft.com/office/powerpoint/2010/main" spd="slow" p14:dur="2000">
         <p159:morph option="byObject"/>
       </p:transition>
     </mc:Choice>
-    <mc:Fallback>
+    <mc:Fallback xmlns="">
       <p:transition spd="slow">
         <p:fade/>
       </p:transition>
@@ -2310,7 +2309,7 @@
         <p:spPr>
           <a:xfrm>
             <a:off x="1377108" y="1591671"/>
-            <a:ext cx="10653311" cy="3170099"/>
+            <a:ext cx="10653311" cy="2862322"/>
           </a:xfrm>
           <a:prstGeom prst="rect">
             <a:avLst/>
@@ -2324,98 +2323,98 @@
           <a:lstStyle/>
           <a:p>
             <a:pPr marL="342900" indent="-342900">
-              <a:buFont typeface="Arial" panose="020B0604020202020204" pitchFamily="34" charset="0"/>
-              <a:buChar char="•"/>
+              <a:buFont typeface="Wingdings" panose="05000000000000000000" pitchFamily="2" charset="2"/>
+              <a:buChar char="§"/>
             </a:pPr>
             <a:r>
-              <a:rPr lang="en-GB" sz="2000" dirty="0"/>
+              <a:rPr lang="en-GB" sz="1800" dirty="0"/>
               <a:t>Simulate traffic congestion in an urban area</a:t>
             </a:r>
           </a:p>
           <a:p>
             <a:pPr marL="990981" lvl="1" indent="-342900">
-              <a:buFont typeface="Arial" panose="020B0604020202020204" pitchFamily="34" charset="0"/>
-              <a:buChar char="•"/>
+              <a:buFont typeface="Wingdings" panose="05000000000000000000" pitchFamily="2" charset="2"/>
+              <a:buChar char="§"/>
             </a:pPr>
             <a:r>
-              <a:rPr lang="en-GB" sz="2000" dirty="0"/>
+              <a:rPr lang="en-GB" sz="1800" dirty="0"/>
               <a:t>Predominately in smaller city</a:t>
             </a:r>
           </a:p>
           <a:p>
             <a:pPr marL="990981" lvl="1" indent="-342900">
-              <a:buFont typeface="Arial" panose="020B0604020202020204" pitchFamily="34" charset="0"/>
-              <a:buChar char="•"/>
+              <a:buFont typeface="Wingdings" panose="05000000000000000000" pitchFamily="2" charset="2"/>
+              <a:buChar char="§"/>
             </a:pPr>
-            <a:endParaRPr lang="en-GB" sz="2000" dirty="0"/>
+            <a:endParaRPr lang="en-GB" sz="1800" dirty="0"/>
           </a:p>
           <a:p>
             <a:pPr marL="342900" indent="-342900">
-              <a:buFont typeface="Arial" panose="020B0604020202020204" pitchFamily="34" charset="0"/>
-              <a:buChar char="•"/>
+              <a:buFont typeface="Wingdings" panose="05000000000000000000" pitchFamily="2" charset="2"/>
+              <a:buChar char="§"/>
             </a:pPr>
             <a:r>
-              <a:rPr lang="en-GB" sz="2000" dirty="0"/>
+              <a:rPr lang="en-GB" sz="1800" dirty="0"/>
               <a:t>Simulate a possible improvement to the traffic problem</a:t>
             </a:r>
           </a:p>
           <a:p>
             <a:pPr marL="990981" lvl="1" indent="-342900">
-              <a:buFont typeface="Arial" panose="020B0604020202020204" pitchFamily="34" charset="0"/>
-              <a:buChar char="•"/>
+              <a:buFont typeface="Wingdings" panose="05000000000000000000" pitchFamily="2" charset="2"/>
+              <a:buChar char="§"/>
             </a:pPr>
             <a:r>
-              <a:rPr lang="en-GB" sz="2000" dirty="0"/>
+              <a:rPr lang="en-GB" sz="1800" dirty="0"/>
               <a:t>Expansion of already existing roads</a:t>
             </a:r>
           </a:p>
           <a:p>
             <a:pPr marL="990981" lvl="1" indent="-342900">
-              <a:buFont typeface="Arial" panose="020B0604020202020204" pitchFamily="34" charset="0"/>
-              <a:buChar char="•"/>
+              <a:buFont typeface="Wingdings" panose="05000000000000000000" pitchFamily="2" charset="2"/>
+              <a:buChar char="§"/>
             </a:pPr>
-            <a:endParaRPr lang="en-GB" sz="2000" dirty="0"/>
+            <a:endParaRPr lang="en-GB" sz="1800" dirty="0"/>
           </a:p>
           <a:p>
             <a:pPr marL="342900" indent="-342900">
-              <a:buFont typeface="Arial" panose="020B0604020202020204" pitchFamily="34" charset="0"/>
-              <a:buChar char="•"/>
+              <a:buFont typeface="Wingdings" panose="05000000000000000000" pitchFamily="2" charset="2"/>
+              <a:buChar char="§"/>
             </a:pPr>
             <a:r>
-              <a:rPr lang="en-GB" sz="2000" dirty="0"/>
+              <a:rPr lang="en-GB" sz="1800" dirty="0"/>
               <a:t>Potential benefit of improved infrastructure</a:t>
             </a:r>
           </a:p>
           <a:p>
             <a:pPr marL="990981" lvl="1" indent="-342900">
-              <a:buFont typeface="Arial" panose="020B0604020202020204" pitchFamily="34" charset="0"/>
-              <a:buChar char="•"/>
+              <a:buFont typeface="Wingdings" panose="05000000000000000000" pitchFamily="2" charset="2"/>
+              <a:buChar char="§"/>
             </a:pPr>
             <a:r>
-              <a:rPr lang="en-GB" sz="2000" dirty="0"/>
+              <a:rPr lang="en-GB" sz="1800" dirty="0"/>
               <a:t>Less travel time</a:t>
             </a:r>
           </a:p>
           <a:p>
             <a:pPr marL="990981" lvl="1" indent="-342900">
-              <a:buFont typeface="Arial" panose="020B0604020202020204" pitchFamily="34" charset="0"/>
-              <a:buChar char="•"/>
+              <a:buFont typeface="Wingdings" panose="05000000000000000000" pitchFamily="2" charset="2"/>
+              <a:buChar char="§"/>
             </a:pPr>
             <a:r>
-              <a:rPr lang="en-GB" sz="2000" dirty="0"/>
+              <a:rPr lang="en-GB" sz="1800" dirty="0"/>
               <a:t>Enhanced transportation network</a:t>
             </a:r>
           </a:p>
           <a:p>
             <a:pPr marL="990981" lvl="1" indent="-342900">
-              <a:buFont typeface="Arial" panose="020B0604020202020204" pitchFamily="34" charset="0"/>
-              <a:buChar char="•"/>
+              <a:buFont typeface="Wingdings" panose="05000000000000000000" pitchFamily="2" charset="2"/>
+              <a:buChar char="§"/>
             </a:pPr>
             <a:r>
-              <a:rPr lang="en-GB" sz="2000" dirty="0"/>
+              <a:rPr lang="en-GB" sz="1800" dirty="0"/>
               <a:t>Positive Influence on the city's development</a:t>
             </a:r>
-            <a:endParaRPr lang="en-AT" sz="2000" dirty="0" err="1"/>
+            <a:endParaRPr lang="en-AT" sz="1800" dirty="0" err="1"/>
           </a:p>
         </p:txBody>
       </p:sp>
@@ -2429,13 +2428,13 @@
   <p:clrMapOvr>
     <a:masterClrMapping/>
   </p:clrMapOvr>
-  <mc:AlternateContent xmlns:mc="http://schemas.openxmlformats.org/markup-compatibility/2006">
-    <mc:Choice xmlns:p159="http://schemas.microsoft.com/office/powerpoint/2015/09/main" Requires="p159">
+  <mc:AlternateContent xmlns:mc="http://schemas.openxmlformats.org/markup-compatibility/2006" xmlns:p159="http://schemas.microsoft.com/office/powerpoint/2015/09/main">
+    <mc:Choice Requires="p159">
       <p:transition xmlns:p14="http://schemas.microsoft.com/office/powerpoint/2010/main" spd="slow" p14:dur="2000">
         <p159:morph option="byObject"/>
       </p:transition>
     </mc:Choice>
-    <mc:Fallback>
+    <mc:Fallback xmlns="">
       <p:transition spd="slow">
         <p:fade/>
       </p:transition>
@@ -2592,7 +2591,7 @@
         <p:spPr>
           <a:xfrm>
             <a:off x="1255923" y="1591671"/>
-            <a:ext cx="6290631" cy="5016758"/>
+            <a:ext cx="6290631" cy="4524315"/>
           </a:xfrm>
           <a:prstGeom prst="rect">
             <a:avLst/>
@@ -2606,128 +2605,135 @@
           <a:lstStyle/>
           <a:p>
             <a:pPr marL="342900" indent="-342900">
-              <a:buFont typeface="Arial" panose="020B0604020202020204" pitchFamily="34" charset="0"/>
-              <a:buChar char="•"/>
+              <a:buFont typeface="Wingdings" panose="05000000000000000000" pitchFamily="2" charset="2"/>
+              <a:buChar char="§"/>
             </a:pPr>
             <a:r>
-              <a:rPr lang="en-GB" sz="2000" dirty="0"/>
+              <a:rPr lang="en-GB" sz="1800" dirty="0"/>
               <a:t>City of Oldenburg (2005) </a:t>
             </a:r>
           </a:p>
           <a:p>
             <a:pPr marL="990981" lvl="1" indent="-342900">
-              <a:buFont typeface="Arial" panose="020B0604020202020204" pitchFamily="34" charset="0"/>
-              <a:buChar char="•"/>
+              <a:buFont typeface="Wingdings" panose="05000000000000000000" pitchFamily="2" charset="2"/>
+              <a:buChar char="§"/>
             </a:pPr>
             <a:r>
-              <a:rPr lang="en-GB" sz="2000" dirty="0"/>
+              <a:rPr lang="en-GB" sz="1800" dirty="0"/>
               <a:t>6105 Nodes (Crossings)</a:t>
             </a:r>
           </a:p>
           <a:p>
             <a:pPr marL="990981" lvl="1" indent="-342900">
-              <a:buFont typeface="Arial" panose="020B0604020202020204" pitchFamily="34" charset="0"/>
-              <a:buChar char="•"/>
+              <a:buFont typeface="Wingdings" panose="05000000000000000000" pitchFamily="2" charset="2"/>
+              <a:buChar char="§"/>
             </a:pPr>
             <a:r>
-              <a:rPr lang="en-GB" sz="2000" dirty="0"/>
+              <a:rPr lang="en-GB" sz="1800" dirty="0"/>
               <a:t>7029 Edges (Roads)</a:t>
             </a:r>
           </a:p>
           <a:p>
             <a:pPr marL="990981" lvl="1" indent="-342900">
-              <a:buFont typeface="Arial" panose="020B0604020202020204" pitchFamily="34" charset="0"/>
-              <a:buChar char="•"/>
+              <a:buFont typeface="Wingdings" panose="05000000000000000000" pitchFamily="2" charset="2"/>
+              <a:buChar char="§"/>
             </a:pPr>
             <a:r>
-              <a:rPr lang="en-GB" sz="2000" dirty="0"/>
+              <a:rPr lang="en-GB" sz="1800" dirty="0"/>
               <a:t>About the size (inhabitants) of Salzburg</a:t>
             </a:r>
           </a:p>
           <a:p>
             <a:pPr marL="990981" lvl="1" indent="-342900">
-              <a:buFont typeface="Arial" panose="020B0604020202020204" pitchFamily="34" charset="0"/>
-              <a:buChar char="•"/>
+              <a:buFont typeface="Wingdings" panose="05000000000000000000" pitchFamily="2" charset="2"/>
+              <a:buChar char="§"/>
             </a:pPr>
-            <a:endParaRPr lang="en-GB" sz="2000" dirty="0"/>
+            <a:endParaRPr lang="en-GB" sz="1800" dirty="0"/>
           </a:p>
           <a:p>
             <a:pPr marL="342900" indent="-342900">
-              <a:buFont typeface="Arial" panose="020B0604020202020204" pitchFamily="34" charset="0"/>
-              <a:buChar char="•"/>
+              <a:buFont typeface="Wingdings" panose="05000000000000000000" pitchFamily="2" charset="2"/>
+              <a:buChar char="§"/>
             </a:pPr>
             <a:r>
-              <a:rPr lang="en-GB" sz="2000" dirty="0"/>
+              <a:rPr lang="en-GB" sz="1800" dirty="0"/>
               <a:t>Agent based simulation</a:t>
             </a:r>
           </a:p>
           <a:p>
             <a:pPr marL="342900" indent="-342900">
-              <a:buFont typeface="Arial" panose="020B0604020202020204" pitchFamily="34" charset="0"/>
-              <a:buChar char="•"/>
+              <a:buFont typeface="Wingdings" panose="05000000000000000000" pitchFamily="2" charset="2"/>
+              <a:buChar char="§"/>
             </a:pPr>
-            <a:endParaRPr lang="en-GB" sz="2000" dirty="0"/>
+            <a:endParaRPr lang="en-GB" sz="1800" dirty="0"/>
           </a:p>
           <a:p>
             <a:pPr marL="342900" indent="-342900">
-              <a:buFont typeface="Arial" panose="020B0604020202020204" pitchFamily="34" charset="0"/>
-              <a:buChar char="•"/>
+              <a:buFont typeface="Wingdings" panose="05000000000000000000" pitchFamily="2" charset="2"/>
+              <a:buChar char="§"/>
             </a:pPr>
             <a:r>
-              <a:rPr lang="en-GB" sz="2000" dirty="0"/>
+              <a:rPr lang="en-GB" sz="1800" dirty="0"/>
               <a:t>Baseline analysis on the unmodified dataset</a:t>
             </a:r>
           </a:p>
           <a:p>
             <a:pPr marL="990981" lvl="1" indent="-342900">
-              <a:buFont typeface="Arial" panose="020B0604020202020204" pitchFamily="34" charset="0"/>
-              <a:buChar char="•"/>
+              <a:buFont typeface="Wingdings" panose="05000000000000000000" pitchFamily="2" charset="2"/>
+              <a:buChar char="§"/>
             </a:pPr>
             <a:r>
-              <a:rPr lang="en-GB" sz="2000" dirty="0"/>
+              <a:rPr lang="en-GB" sz="1800" dirty="0"/>
               <a:t>Identify bottlenecks</a:t>
             </a:r>
           </a:p>
           <a:p>
             <a:pPr marL="990981" lvl="1" indent="-342900">
-              <a:buFont typeface="Arial" panose="020B0604020202020204" pitchFamily="34" charset="0"/>
-              <a:buChar char="•"/>
+              <a:buFont typeface="Wingdings" panose="05000000000000000000" pitchFamily="2" charset="2"/>
+              <a:buChar char="§"/>
             </a:pPr>
             <a:r>
-              <a:rPr lang="en-GB" sz="2000" dirty="0"/>
+              <a:rPr lang="en-GB" sz="1800" dirty="0"/>
               <a:t>Determine which roads to expand</a:t>
             </a:r>
           </a:p>
           <a:p>
             <a:pPr marL="990981" lvl="1" indent="-342900">
-              <a:buFont typeface="Arial" panose="020B0604020202020204" pitchFamily="34" charset="0"/>
-              <a:buChar char="•"/>
+              <a:buFont typeface="Wingdings" panose="05000000000000000000" pitchFamily="2" charset="2"/>
+              <a:buChar char="§"/>
             </a:pPr>
-            <a:endParaRPr lang="en-GB" sz="2000" dirty="0"/>
+            <a:endParaRPr lang="en-GB" sz="1800" dirty="0"/>
           </a:p>
           <a:p>
             <a:pPr marL="342900" indent="-342900">
-              <a:buFont typeface="Arial" panose="020B0604020202020204" pitchFamily="34" charset="0"/>
-              <a:buChar char="•"/>
+              <a:buFont typeface="Wingdings" panose="05000000000000000000" pitchFamily="2" charset="2"/>
+              <a:buChar char="§"/>
             </a:pPr>
             <a:r>
-              <a:rPr lang="en-GB" sz="2000" dirty="0"/>
+              <a:rPr lang="en-GB" sz="1800" dirty="0"/>
               <a:t>Determine if the efficiency has been improved with the expansion of the road to a highway</a:t>
             </a:r>
           </a:p>
           <a:p>
-            <a:endParaRPr lang="en-GB" sz="2000" dirty="0"/>
-          </a:p>
-          <a:p>
-            <a:pPr lvl="1"/>
-            <a:endParaRPr lang="en-GB" sz="2000" dirty="0"/>
+            <a:pPr marL="342900" indent="-342900">
+              <a:buFont typeface="Wingdings" panose="05000000000000000000" pitchFamily="2" charset="2"/>
+              <a:buChar char="§"/>
+            </a:pPr>
+            <a:endParaRPr lang="en-GB" sz="1800" dirty="0"/>
           </a:p>
           <a:p>
             <a:pPr marL="990981" lvl="1" indent="-342900">
-              <a:buFont typeface="Arial" panose="020B0604020202020204" pitchFamily="34" charset="0"/>
-              <a:buChar char="•"/>
+              <a:buFont typeface="Wingdings" panose="05000000000000000000" pitchFamily="2" charset="2"/>
+              <a:buChar char="§"/>
             </a:pPr>
-            <a:endParaRPr lang="en-GB" sz="2000" dirty="0"/>
+            <a:endParaRPr lang="en-GB" sz="1800" dirty="0"/>
+          </a:p>
+          <a:p>
+            <a:pPr marL="990981" lvl="1" indent="-342900">
+              <a:buFont typeface="Wingdings" panose="05000000000000000000" pitchFamily="2" charset="2"/>
+              <a:buChar char="§"/>
+            </a:pPr>
+            <a:endParaRPr lang="en-GB" sz="1800" dirty="0"/>
           </a:p>
         </p:txBody>
       </p:sp>
@@ -2741,13 +2747,13 @@
   <p:clrMapOvr>
     <a:masterClrMapping/>
   </p:clrMapOvr>
-  <mc:AlternateContent xmlns:mc="http://schemas.openxmlformats.org/markup-compatibility/2006">
-    <mc:Choice xmlns:p159="http://schemas.microsoft.com/office/powerpoint/2015/09/main" Requires="p159">
+  <mc:AlternateContent xmlns:mc="http://schemas.openxmlformats.org/markup-compatibility/2006" xmlns:p159="http://schemas.microsoft.com/office/powerpoint/2015/09/main">
+    <mc:Choice Requires="p159">
       <p:transition xmlns:p14="http://schemas.microsoft.com/office/powerpoint/2010/main" spd="slow" p14:dur="2000">
         <p159:morph option="byObject"/>
       </p:transition>
     </mc:Choice>
-    <mc:Fallback>
+    <mc:Fallback xmlns="">
       <p:transition spd="slow">
         <p:fade/>
       </p:transition>
@@ -2862,10 +2868,10 @@
       </p:pic>
       <p:sp>
         <p:nvSpPr>
-          <p:cNvPr id="5" name="TextBox 4">
+          <p:cNvPr id="6" name="TextBox 5">
             <a:extLst>
               <a:ext uri="{FF2B5EF4-FFF2-40B4-BE49-F238E27FC236}">
-                <a16:creationId xmlns:a16="http://schemas.microsoft.com/office/drawing/2014/main" id="{F4883D65-779E-A74D-9EF7-221862032848}"/>
+                <a16:creationId xmlns:a16="http://schemas.microsoft.com/office/drawing/2014/main" id="{D4B5C24B-A148-3A50-3DA2-6B751F6A0773}"/>
               </a:ext>
             </a:extLst>
           </p:cNvPr>
@@ -2874,8 +2880,8 @@
         </p:nvSpPr>
         <p:spPr>
           <a:xfrm>
-            <a:off x="1545544" y="2273080"/>
-            <a:ext cx="4600075" cy="369332"/>
+            <a:off x="1545544" y="2717867"/>
+            <a:ext cx="4600075" cy="584775"/>
           </a:xfrm>
           <a:prstGeom prst="rect">
             <a:avLst/>
@@ -2888,42 +2894,6 @@
           </a:bodyPr>
           <a:lstStyle/>
           <a:p>
-            <a:r>
-              <a:rPr lang="en-AT" sz="1800" b="1" dirty="0"/>
-              <a:t>Algorithm</a:t>
-            </a:r>
-            <a:endParaRPr lang="bs-Latn-BA" sz="1800" b="1" dirty="0"/>
-          </a:p>
-        </p:txBody>
-      </p:sp>
-      <p:sp>
-        <p:nvSpPr>
-          <p:cNvPr id="6" name="TextBox 5">
-            <a:extLst>
-              <a:ext uri="{FF2B5EF4-FFF2-40B4-BE49-F238E27FC236}">
-                <a16:creationId xmlns:a16="http://schemas.microsoft.com/office/drawing/2014/main" id="{D4B5C24B-A148-3A50-3DA2-6B751F6A0773}"/>
-              </a:ext>
-            </a:extLst>
-          </p:cNvPr>
-          <p:cNvSpPr txBox="1"/>
-          <p:nvPr/>
-        </p:nvSpPr>
-        <p:spPr>
-          <a:xfrm>
-            <a:off x="1545544" y="2717867"/>
-            <a:ext cx="4600075" cy="830997"/>
-          </a:xfrm>
-          <a:prstGeom prst="rect">
-            <a:avLst/>
-          </a:prstGeom>
-          <a:noFill/>
-        </p:spPr>
-        <p:txBody>
-          <a:bodyPr wrap="square" lIns="0" rtlCol="0">
-            <a:spAutoFit/>
-          </a:bodyPr>
-          <a:lstStyle/>
-          <a:p>
             <a:pPr marL="285750" indent="-285750">
               <a:buFont typeface="Wingdings" panose="05000000000000000000" pitchFamily="2" charset="2"/>
               <a:buChar char="§"/>
@@ -2936,28 +2906,6 @@
               <a:buChar char="§"/>
             </a:pPr>
             <a:endParaRPr lang="en-AT" sz="1600" dirty="0"/>
-          </a:p>
-          <a:p>
-            <a:pPr marL="285750" indent="-285750">
-              <a:buFont typeface="Wingdings" panose="05000000000000000000" pitchFamily="2" charset="2"/>
-              <a:buChar char="§"/>
-            </a:pPr>
-            <a:r>
-              <a:rPr lang="en-AT" sz="1600" dirty="0"/>
-              <a:t>Find the </a:t>
-            </a:r>
-            <a:r>
-              <a:rPr lang="en-AT" sz="1600" dirty="0">
-                <a:solidFill>
-                  <a:srgbClr val="FF0000"/>
-                </a:solidFill>
-              </a:rPr>
-              <a:t>shortest paths</a:t>
-            </a:r>
-            <a:r>
-              <a:rPr lang="en-AT" sz="1600" dirty="0"/>
-              <a:t> between the pairs</a:t>
-            </a:r>
           </a:p>
         </p:txBody>
       </p:sp>
@@ -3539,8 +3487,8 @@
         </p:nvSpPr>
         <p:spPr>
           <a:xfrm>
-            <a:off x="1545544" y="2712854"/>
-            <a:ext cx="4600075" cy="338554"/>
+            <a:off x="1347424" y="1656037"/>
+            <a:ext cx="6179227" cy="4473019"/>
           </a:xfrm>
           <a:prstGeom prst="rect">
             <a:avLst/>
@@ -3553,23 +3501,164 @@
           </a:bodyPr>
           <a:lstStyle/>
           <a:p>
+            <a:r>
+              <a:rPr lang="en-AT" sz="1800" b="1" dirty="0"/>
+              <a:t>Algorithm</a:t>
+            </a:r>
+            <a:endParaRPr lang="bs-Latn-BA" sz="1800" b="1" dirty="0"/>
+          </a:p>
+          <a:p>
             <a:pPr marL="285750" indent="-285750">
               <a:buFont typeface="Wingdings" panose="05000000000000000000" pitchFamily="2" charset="2"/>
               <a:buChar char="§"/>
             </a:pPr>
-            <a:r>
-              <a:rPr lang="en-AT" sz="1600" dirty="0"/>
+            <a:endParaRPr lang="en-GB" sz="1800" dirty="0"/>
+          </a:p>
+          <a:p>
+            <a:pPr marL="285750" indent="-285750">
+              <a:lnSpc>
+                <a:spcPct val="150000"/>
+              </a:lnSpc>
+              <a:buFont typeface="Wingdings" panose="05000000000000000000" pitchFamily="2" charset="2"/>
+              <a:buChar char="§"/>
+            </a:pPr>
+            <a:r>
+              <a:rPr lang="en-AT" sz="1800" dirty="0"/>
               <a:t>Find n furthest </a:t>
             </a:r>
             <a:r>
-              <a:rPr lang="en-AT" sz="1600" dirty="0">
+              <a:rPr lang="en-AT" sz="1800" dirty="0">
                 <a:solidFill>
                   <a:srgbClr val="FF0000"/>
                 </a:solidFill>
               </a:rPr>
               <a:t>node pairs</a:t>
             </a:r>
-            <a:endParaRPr lang="en-AT" sz="1600" dirty="0"/>
+            <a:endParaRPr lang="en-GB" sz="1800" dirty="0">
+              <a:solidFill>
+                <a:srgbClr val="FF0000"/>
+              </a:solidFill>
+            </a:endParaRPr>
+          </a:p>
+          <a:p>
+            <a:pPr marL="285750" indent="-285750">
+              <a:lnSpc>
+                <a:spcPct val="150000"/>
+              </a:lnSpc>
+              <a:buFont typeface="Wingdings" panose="05000000000000000000" pitchFamily="2" charset="2"/>
+              <a:buChar char="§"/>
+            </a:pPr>
+            <a:r>
+              <a:rPr lang="en-AT" sz="1800" dirty="0"/>
+              <a:t>Find the </a:t>
+            </a:r>
+            <a:r>
+              <a:rPr lang="en-AT" sz="1800" dirty="0">
+                <a:solidFill>
+                  <a:srgbClr val="FF0000"/>
+                </a:solidFill>
+              </a:rPr>
+              <a:t>shortest paths</a:t>
+            </a:r>
+            <a:r>
+              <a:rPr lang="en-AT" sz="1800" dirty="0"/>
+              <a:t> between the pairs</a:t>
+            </a:r>
+            <a:endParaRPr lang="en-GB" sz="1800" dirty="0"/>
+          </a:p>
+          <a:p>
+            <a:pPr marL="285750" indent="-285750">
+              <a:lnSpc>
+                <a:spcPct val="150000"/>
+              </a:lnSpc>
+              <a:buFont typeface="Wingdings" panose="05000000000000000000" pitchFamily="2" charset="2"/>
+              <a:buChar char="§"/>
+            </a:pPr>
+            <a:r>
+              <a:rPr lang="en-AT" sz="1800" dirty="0"/>
+              <a:t>Pick m </a:t>
+            </a:r>
+            <a:r>
+              <a:rPr lang="en-AT" sz="1800" b="1" dirty="0"/>
+              <a:t>most visited edges</a:t>
+            </a:r>
+            <a:endParaRPr lang="en-GB" sz="1800" b="1" dirty="0"/>
+          </a:p>
+          <a:p>
+            <a:pPr marL="285750" indent="-285750">
+              <a:lnSpc>
+                <a:spcPct val="150000"/>
+              </a:lnSpc>
+              <a:buFont typeface="Wingdings" panose="05000000000000000000" pitchFamily="2" charset="2"/>
+              <a:buChar char="§"/>
+            </a:pPr>
+            <a:r>
+              <a:rPr lang="en-GB" sz="1800" dirty="0"/>
+              <a:t>Adapt their attributes to simulate highways</a:t>
+            </a:r>
+          </a:p>
+          <a:p>
+            <a:pPr marL="285750" indent="-285750">
+              <a:lnSpc>
+                <a:spcPct val="150000"/>
+              </a:lnSpc>
+              <a:buFont typeface="Wingdings" panose="05000000000000000000" pitchFamily="2" charset="2"/>
+              <a:buChar char="§"/>
+            </a:pPr>
+            <a:r>
+              <a:rPr lang="en-GB" sz="1800" dirty="0"/>
+              <a:t>Compare metrics for different setups</a:t>
+            </a:r>
+            <a:endParaRPr lang="bs-Latn-BA" sz="1800" dirty="0"/>
+          </a:p>
+          <a:p>
+            <a:endParaRPr lang="en-GB" sz="1800" dirty="0"/>
+          </a:p>
+          <a:p>
+            <a:r>
+              <a:rPr lang="en-GB" sz="1800" b="1" dirty="0"/>
+              <a:t>Metrics</a:t>
+            </a:r>
+          </a:p>
+          <a:p>
+            <a:pPr marL="285750" indent="-285750">
+              <a:lnSpc>
+                <a:spcPct val="150000"/>
+              </a:lnSpc>
+              <a:buFont typeface="Wingdings" panose="05000000000000000000" pitchFamily="2" charset="2"/>
+              <a:buChar char="§"/>
+            </a:pPr>
+            <a:r>
+              <a:rPr lang="en-GB" sz="1800" dirty="0"/>
+              <a:t>Average shortest path (weights/ lengths)</a:t>
+            </a:r>
+          </a:p>
+          <a:p>
+            <a:pPr marL="285750" indent="-285750">
+              <a:lnSpc>
+                <a:spcPct val="150000"/>
+              </a:lnSpc>
+              <a:buFont typeface="Wingdings" panose="05000000000000000000" pitchFamily="2" charset="2"/>
+              <a:buChar char="§"/>
+            </a:pPr>
+            <a:r>
+              <a:rPr lang="en-GB" sz="1800" dirty="0"/>
+              <a:t>Graph resilience</a:t>
+            </a:r>
+          </a:p>
+          <a:p>
+            <a:pPr marL="285750" indent="-285750">
+              <a:lnSpc>
+                <a:spcPct val="150000"/>
+              </a:lnSpc>
+              <a:buFont typeface="Wingdings" panose="05000000000000000000" pitchFamily="2" charset="2"/>
+              <a:buChar char="§"/>
+            </a:pPr>
+            <a:r>
+              <a:rPr lang="en-GB" sz="1800" dirty="0"/>
+              <a:t>Degree</a:t>
+            </a:r>
+            <a:endParaRPr lang="en-AT" sz="1800" dirty="0"/>
           </a:p>
         </p:txBody>
       </p:sp>
@@ -3739,10 +3828,15 @@
                             </p:stCondLst>
                             <p:childTnLst>
                               <p:par>
-                                <p:cTn id="16" presetID="10" presetClass="entr" presetSubtype="0" fill="hold" grpId="0" nodeType="clickEffect">
+                                <p:cTn id="16" presetID="10" presetClass="entr" presetSubtype="0" fill="hold" grpId="0" nodeType="clickEffect" nodePh="1">
                                   <p:stCondLst>
                                     <p:cond delay="0"/>
                                   </p:stCondLst>
+                                  <p:endCondLst>
+                                    <p:cond evt="begin" delay="0">
+                                      <p:tn val="16"/>
+                                    </p:cond>
+                                  </p:endCondLst>
                                   <p:childTnLst>
                                     <p:set>
                                       <p:cBhvr>
@@ -3862,116 +3956,6 @@
       </p:grpSpPr>
       <p:sp>
         <p:nvSpPr>
-          <p:cNvPr id="35" name="TextBox 34">
-            <a:extLst>
-              <a:ext uri="{FF2B5EF4-FFF2-40B4-BE49-F238E27FC236}">
-                <a16:creationId xmlns:a16="http://schemas.microsoft.com/office/drawing/2014/main" id="{A30D720E-29E6-26E4-586D-1E95DC9A3D74}"/>
-              </a:ext>
-            </a:extLst>
-          </p:cNvPr>
-          <p:cNvSpPr txBox="1"/>
-          <p:nvPr/>
-        </p:nvSpPr>
-        <p:spPr>
-          <a:xfrm>
-            <a:off x="1545544" y="2717867"/>
-            <a:ext cx="4600075" cy="2308324"/>
-          </a:xfrm>
-          <a:prstGeom prst="rect">
-            <a:avLst/>
-          </a:prstGeom>
-          <a:noFill/>
-        </p:spPr>
-        <p:txBody>
-          <a:bodyPr wrap="square" lIns="0" rtlCol="0">
-            <a:spAutoFit/>
-          </a:bodyPr>
-          <a:lstStyle/>
-          <a:p>
-            <a:endParaRPr lang="en-AT" sz="1600" dirty="0"/>
-          </a:p>
-          <a:p>
-            <a:endParaRPr lang="en-AT" sz="1600" dirty="0"/>
-          </a:p>
-          <a:p>
-            <a:endParaRPr lang="en-AT" sz="1600" dirty="0"/>
-          </a:p>
-          <a:p>
-            <a:endParaRPr lang="en-AT" sz="1600" dirty="0"/>
-          </a:p>
-          <a:p>
-            <a:pPr marL="285750" indent="-285750">
-              <a:buFont typeface="Wingdings" panose="05000000000000000000" pitchFamily="2" charset="2"/>
-              <a:buChar char="§"/>
-            </a:pPr>
-            <a:endParaRPr lang="en-AT" sz="1600" dirty="0"/>
-          </a:p>
-          <a:p>
-            <a:pPr marL="285750" indent="-285750">
-              <a:buFont typeface="Wingdings" panose="05000000000000000000" pitchFamily="2" charset="2"/>
-              <a:buChar char="§"/>
-            </a:pPr>
-            <a:endParaRPr lang="en-AT" sz="1600" dirty="0"/>
-          </a:p>
-          <a:p>
-            <a:pPr marL="285750" indent="-285750">
-              <a:buFont typeface="Wingdings" panose="05000000000000000000" pitchFamily="2" charset="2"/>
-              <a:buChar char="§"/>
-            </a:pPr>
-            <a:endParaRPr lang="en-AT" sz="1600" dirty="0"/>
-          </a:p>
-          <a:p>
-            <a:pPr marL="285750" indent="-285750">
-              <a:buFont typeface="Wingdings" panose="05000000000000000000" pitchFamily="2" charset="2"/>
-              <a:buChar char="§"/>
-            </a:pPr>
-            <a:r>
-              <a:rPr lang="en-AT" sz="1600" dirty="0"/>
-              <a:t>Pick m </a:t>
-            </a:r>
-            <a:r>
-              <a:rPr lang="en-AT" sz="1600" b="1" dirty="0"/>
-              <a:t>most visited edges</a:t>
-            </a:r>
-            <a:r>
-              <a:rPr lang="en-AT" sz="1600" dirty="0"/>
-              <a:t> and lower their length</a:t>
-            </a:r>
-            <a:endParaRPr lang="bs-Latn-BA" sz="1600" dirty="0"/>
-          </a:p>
-        </p:txBody>
-      </p:sp>
-      <p:pic>
-        <p:nvPicPr>
-          <p:cNvPr id="37" name="Picture 36" descr="A map of a city&#10;&#10;Description automatically generated">
-            <a:extLst>
-              <a:ext uri="{FF2B5EF4-FFF2-40B4-BE49-F238E27FC236}">
-                <a16:creationId xmlns:a16="http://schemas.microsoft.com/office/drawing/2014/main" id="{7104ADF6-F511-F4C0-980E-A3EC182C3596}"/>
-              </a:ext>
-            </a:extLst>
-          </p:cNvPr>
-          <p:cNvPicPr>
-            <a:picLocks noChangeAspect="1"/>
-          </p:cNvPicPr>
-          <p:nvPr/>
-        </p:nvPicPr>
-        <p:blipFill rotWithShape="1">
-          <a:blip r:embed="rId2"/>
-          <a:srcRect l="15873" t="17368" r="15735" b="14368"/>
-          <a:stretch/>
-        </p:blipFill>
-        <p:spPr>
-          <a:xfrm>
-            <a:off x="8133906" y="2007984"/>
-            <a:ext cx="3880885" cy="3873389"/>
-          </a:xfrm>
-          <a:prstGeom prst="rect">
-            <a:avLst/>
-          </a:prstGeom>
-        </p:spPr>
-      </p:pic>
-      <p:sp>
-        <p:nvSpPr>
           <p:cNvPr id="2" name="Title 1">
             <a:extLst>
               <a:ext uri="{FF2B5EF4-FFF2-40B4-BE49-F238E27FC236}">
@@ -3992,8 +3976,8 @@
           <a:lstStyle/>
           <a:p>
             <a:r>
-              <a:rPr lang="bs-Latn-BA" dirty="0"/>
-              <a:t>Methodology</a:t>
+              <a:rPr lang="en-AT" dirty="0"/>
+              <a:t>Results</a:t>
             </a:r>
             <a:endParaRPr lang="en-US" dirty="0"/>
           </a:p>
@@ -4028,41 +4012,12 @@
           </a:p>
         </p:txBody>
       </p:sp>
-      <p:pic>
-        <p:nvPicPr>
-          <p:cNvPr id="3" name="Picture 2" descr="A map of a city&#10;&#10;Description automatically generated">
+      <p:sp>
+        <p:nvSpPr>
+          <p:cNvPr id="3" name="TextBox 2">
             <a:extLst>
               <a:ext uri="{FF2B5EF4-FFF2-40B4-BE49-F238E27FC236}">
-                <a16:creationId xmlns:a16="http://schemas.microsoft.com/office/drawing/2014/main" id="{FE86A2EF-4E4C-58D9-3709-9920B57800F9}"/>
-              </a:ext>
-            </a:extLst>
-          </p:cNvPr>
-          <p:cNvPicPr>
-            <a:picLocks noChangeAspect="1"/>
-          </p:cNvPicPr>
-          <p:nvPr/>
-        </p:nvPicPr>
-        <p:blipFill rotWithShape="1">
-          <a:blip r:embed="rId3"/>
-          <a:srcRect l="18567" t="17412" r="15978" b="16596"/>
-          <a:stretch/>
-        </p:blipFill>
-        <p:spPr>
-          <a:xfrm>
-            <a:off x="13577221" y="1968591"/>
-            <a:ext cx="3880885" cy="3912782"/>
-          </a:xfrm>
-          <a:prstGeom prst="rect">
-            <a:avLst/>
-          </a:prstGeom>
-        </p:spPr>
-      </p:pic>
-      <p:sp>
-        <p:nvSpPr>
-          <p:cNvPr id="5" name="TextBox 4">
-            <a:extLst>
-              <a:ext uri="{FF2B5EF4-FFF2-40B4-BE49-F238E27FC236}">
-                <a16:creationId xmlns:a16="http://schemas.microsoft.com/office/drawing/2014/main" id="{F4883D65-779E-A74D-9EF7-221862032848}"/>
+                <a16:creationId xmlns:a16="http://schemas.microsoft.com/office/drawing/2014/main" id="{6EF3D63B-0AD4-EB4C-E6A2-26CF7307089E}"/>
               </a:ext>
             </a:extLst>
           </p:cNvPr>
@@ -4072,7 +4027,7 @@
         <p:spPr>
           <a:xfrm>
             <a:off x="1545544" y="2273080"/>
-            <a:ext cx="4600075" cy="369332"/>
+            <a:ext cx="4600075" cy="400110"/>
           </a:xfrm>
           <a:prstGeom prst="rect">
             <a:avLst/>
@@ -4086,19 +4041,19 @@
           <a:lstStyle/>
           <a:p>
             <a:r>
-              <a:rPr lang="en-AT" sz="1800" b="1" dirty="0"/>
-              <a:t>Algorithm</a:t>
-            </a:r>
-            <a:endParaRPr lang="bs-Latn-BA" sz="1800" b="1" dirty="0"/>
+              <a:rPr lang="en-AT" sz="2000" b="1" dirty="0"/>
+              <a:t>Shortest paths</a:t>
+            </a:r>
+            <a:endParaRPr lang="bs-Latn-BA" sz="2000" b="1" dirty="0"/>
           </a:p>
         </p:txBody>
       </p:sp>
       <p:sp>
         <p:nvSpPr>
-          <p:cNvPr id="6" name="TextBox 5">
+          <p:cNvPr id="12" name="TextBox 11">
             <a:extLst>
               <a:ext uri="{FF2B5EF4-FFF2-40B4-BE49-F238E27FC236}">
-                <a16:creationId xmlns:a16="http://schemas.microsoft.com/office/drawing/2014/main" id="{D4B5C24B-A148-3A50-3DA2-6B751F6A0773}"/>
+                <a16:creationId xmlns:a16="http://schemas.microsoft.com/office/drawing/2014/main" id="{6353C1FB-8A2E-23A8-01AC-72317A7C237C}"/>
               </a:ext>
             </a:extLst>
           </p:cNvPr>
@@ -4107,8 +4062,8 @@
         </p:nvSpPr>
         <p:spPr>
           <a:xfrm>
-            <a:off x="1545544" y="2717867"/>
-            <a:ext cx="4600075" cy="1569660"/>
+            <a:off x="6792506" y="2273080"/>
+            <a:ext cx="4600075" cy="400110"/>
           </a:xfrm>
           <a:prstGeom prst="rect">
             <a:avLst/>
@@ -4121,482 +4076,11 @@
           </a:bodyPr>
           <a:lstStyle/>
           <a:p>
-            <a:endParaRPr lang="en-AT" sz="1600" dirty="0"/>
-          </a:p>
-          <a:p>
-            <a:endParaRPr lang="en-AT" sz="1600" dirty="0"/>
-          </a:p>
-          <a:p>
-            <a:endParaRPr lang="en-AT" sz="1600" dirty="0"/>
-          </a:p>
-          <a:p>
-            <a:endParaRPr lang="en-AT" sz="1600" dirty="0"/>
-          </a:p>
-          <a:p>
-            <a:pPr marL="285750" indent="-285750">
-              <a:buFont typeface="Wingdings" panose="05000000000000000000" pitchFamily="2" charset="2"/>
-              <a:buChar char="§"/>
-            </a:pPr>
-            <a:r>
-              <a:rPr lang="en-AT" sz="1600" dirty="0"/>
-              <a:t>Construct a </a:t>
-            </a:r>
-            <a:r>
-              <a:rPr lang="en-AT" sz="1600" b="1" dirty="0">
-                <a:highlight>
-                  <a:srgbClr val="FFFFFF"/>
-                </a:highlight>
-              </a:rPr>
-              <a:t>heatmap</a:t>
-            </a:r>
-            <a:r>
-              <a:rPr lang="en-AT" sz="1600" dirty="0"/>
-              <a:t> of the most visited edges</a:t>
-            </a:r>
-            <a:endParaRPr lang="bs-Latn-BA" sz="1600" dirty="0"/>
-          </a:p>
-        </p:txBody>
-      </p:sp>
-      <p:pic>
-        <p:nvPicPr>
-          <p:cNvPr id="8" name="Graphic 7" descr="Marker with solid fill">
-            <a:extLst>
-              <a:ext uri="{FF2B5EF4-FFF2-40B4-BE49-F238E27FC236}">
-                <a16:creationId xmlns:a16="http://schemas.microsoft.com/office/drawing/2014/main" id="{B5F74511-C3C2-21F7-F0CD-50F66112AD38}"/>
-              </a:ext>
-            </a:extLst>
-          </p:cNvPr>
-          <p:cNvPicPr>
-            <a:picLocks noChangeAspect="1"/>
-          </p:cNvPicPr>
-          <p:nvPr/>
-        </p:nvPicPr>
-        <p:blipFill>
-          <a:blip r:embed="rId4">
-            <a:extLst>
-              <a:ext uri="{96DAC541-7B7A-43D3-8B79-37D633B846F1}">
-                <asvg:svgBlip xmlns:asvg="http://schemas.microsoft.com/office/drawing/2016/SVG/main" r:embed="rId5"/>
-              </a:ext>
-            </a:extLst>
-          </a:blip>
-          <a:stretch>
-            <a:fillRect/>
-          </a:stretch>
-        </p:blipFill>
-        <p:spPr>
-          <a:xfrm>
-            <a:off x="15517663" y="5336491"/>
-            <a:ext cx="544882" cy="544882"/>
-          </a:xfrm>
-          <a:prstGeom prst="rect">
-            <a:avLst/>
-          </a:prstGeom>
-        </p:spPr>
-      </p:pic>
-      <p:pic>
-        <p:nvPicPr>
-          <p:cNvPr id="9" name="Graphic 8" descr="Marker with solid fill">
-            <a:extLst>
-              <a:ext uri="{FF2B5EF4-FFF2-40B4-BE49-F238E27FC236}">
-                <a16:creationId xmlns:a16="http://schemas.microsoft.com/office/drawing/2014/main" id="{F11C7FB5-4DEC-4FFF-6D5A-9E47D4FCC37D}"/>
-              </a:ext>
-            </a:extLst>
-          </p:cNvPr>
-          <p:cNvPicPr>
-            <a:picLocks noChangeAspect="1"/>
-          </p:cNvPicPr>
-          <p:nvPr/>
-        </p:nvPicPr>
-        <p:blipFill>
-          <a:blip r:embed="rId4">
-            <a:extLst>
-              <a:ext uri="{96DAC541-7B7A-43D3-8B79-37D633B846F1}">
-                <asvg:svgBlip xmlns:asvg="http://schemas.microsoft.com/office/drawing/2016/SVG/main" r:embed="rId5"/>
-              </a:ext>
-            </a:extLst>
-          </a:blip>
-          <a:stretch>
-            <a:fillRect/>
-          </a:stretch>
-        </p:blipFill>
-        <p:spPr>
-          <a:xfrm>
-            <a:off x="15403400" y="1571974"/>
-            <a:ext cx="544882" cy="544882"/>
-          </a:xfrm>
-          <a:prstGeom prst="rect">
-            <a:avLst/>
-          </a:prstGeom>
-        </p:spPr>
-      </p:pic>
-      <p:sp>
-        <p:nvSpPr>
-          <p:cNvPr id="33" name="TextBox 32">
-            <a:extLst>
-              <a:ext uri="{FF2B5EF4-FFF2-40B4-BE49-F238E27FC236}">
-                <a16:creationId xmlns:a16="http://schemas.microsoft.com/office/drawing/2014/main" id="{1C4D7E09-FE3F-7058-02D3-7F6A1ACFFB4A}"/>
-              </a:ext>
-            </a:extLst>
-          </p:cNvPr>
-          <p:cNvSpPr txBox="1"/>
-          <p:nvPr/>
-        </p:nvSpPr>
-        <p:spPr>
-          <a:xfrm>
-            <a:off x="1545544" y="2717867"/>
-            <a:ext cx="4600075" cy="830997"/>
-          </a:xfrm>
-          <a:prstGeom prst="rect">
-            <a:avLst/>
-          </a:prstGeom>
-          <a:noFill/>
-        </p:spPr>
-        <p:txBody>
-          <a:bodyPr wrap="square" lIns="0" rtlCol="0">
-            <a:spAutoFit/>
-          </a:bodyPr>
-          <a:lstStyle/>
-          <a:p>
-            <a:pPr marL="285750" indent="-285750">
-              <a:buFont typeface="Wingdings" panose="05000000000000000000" pitchFamily="2" charset="2"/>
-              <a:buChar char="§"/>
-            </a:pPr>
-            <a:endParaRPr lang="en-AT" sz="1600" dirty="0"/>
-          </a:p>
-          <a:p>
-            <a:pPr marL="285750" indent="-285750">
-              <a:buFont typeface="Wingdings" panose="05000000000000000000" pitchFamily="2" charset="2"/>
-              <a:buChar char="§"/>
-            </a:pPr>
-            <a:endParaRPr lang="en-AT" sz="1600" dirty="0"/>
-          </a:p>
-          <a:p>
-            <a:pPr marL="285750" indent="-285750">
-              <a:buFont typeface="Wingdings" panose="05000000000000000000" pitchFamily="2" charset="2"/>
-              <a:buChar char="§"/>
-            </a:pPr>
-            <a:r>
-              <a:rPr lang="en-AT" sz="1600" dirty="0"/>
-              <a:t>Find the </a:t>
-            </a:r>
-            <a:r>
-              <a:rPr lang="en-AT" sz="1600" dirty="0">
-                <a:solidFill>
-                  <a:srgbClr val="FF0000"/>
-                </a:solidFill>
-              </a:rPr>
-              <a:t>shortest paths</a:t>
-            </a:r>
-            <a:r>
-              <a:rPr lang="en-AT" sz="1600" dirty="0"/>
-              <a:t> between the pairs</a:t>
-            </a:r>
-          </a:p>
-        </p:txBody>
-      </p:sp>
-      <p:sp>
-        <p:nvSpPr>
-          <p:cNvPr id="34" name="TextBox 33">
-            <a:extLst>
-              <a:ext uri="{FF2B5EF4-FFF2-40B4-BE49-F238E27FC236}">
-                <a16:creationId xmlns:a16="http://schemas.microsoft.com/office/drawing/2014/main" id="{D04D6095-E65D-1600-F16F-E91004DFFC07}"/>
-              </a:ext>
-            </a:extLst>
-          </p:cNvPr>
-          <p:cNvSpPr txBox="1"/>
-          <p:nvPr/>
-        </p:nvSpPr>
-        <p:spPr>
-          <a:xfrm>
-            <a:off x="1545544" y="2712854"/>
-            <a:ext cx="4600075" cy="338554"/>
-          </a:xfrm>
-          <a:prstGeom prst="rect">
-            <a:avLst/>
-          </a:prstGeom>
-          <a:noFill/>
-        </p:spPr>
-        <p:txBody>
-          <a:bodyPr wrap="square" lIns="0" rtlCol="0">
-            <a:spAutoFit/>
-          </a:bodyPr>
-          <a:lstStyle/>
-          <a:p>
-            <a:pPr marL="285750" indent="-285750">
-              <a:buFont typeface="Wingdings" panose="05000000000000000000" pitchFamily="2" charset="2"/>
-              <a:buChar char="§"/>
-            </a:pPr>
-            <a:r>
-              <a:rPr lang="en-AT" sz="1600" dirty="0"/>
-              <a:t>Find n furthest </a:t>
-            </a:r>
-            <a:r>
-              <a:rPr lang="en-AT" sz="1600" dirty="0">
-                <a:solidFill>
-                  <a:srgbClr val="FF0000"/>
-                </a:solidFill>
-              </a:rPr>
-              <a:t>node pairs</a:t>
-            </a:r>
-            <a:endParaRPr lang="en-AT" sz="1600" dirty="0"/>
-          </a:p>
-        </p:txBody>
-      </p:sp>
-    </p:spTree>
-    <p:extLst>
-      <p:ext uri="{BB962C8B-B14F-4D97-AF65-F5344CB8AC3E}">
-        <p14:creationId xmlns:p14="http://schemas.microsoft.com/office/powerpoint/2010/main" val="4054966976"/>
-      </p:ext>
-    </p:extLst>
-  </p:cSld>
-  <p:clrMapOvr>
-    <a:masterClrMapping/>
-  </p:clrMapOvr>
-  <mc:AlternateContent xmlns:mc="http://schemas.openxmlformats.org/markup-compatibility/2006">
-    <mc:Choice xmlns:p159="http://schemas.microsoft.com/office/powerpoint/2015/09/main" Requires="p159">
-      <p:transition xmlns:p14="http://schemas.microsoft.com/office/powerpoint/2010/main" spd="slow" p14:dur="2000">
-        <p159:morph option="byObject"/>
-      </p:transition>
-    </mc:Choice>
-    <mc:Fallback>
-      <p:transition spd="slow">
-        <p:fade/>
-      </p:transition>
-    </mc:Fallback>
-  </mc:AlternateContent>
-  <p:timing>
-    <p:tnLst>
-      <p:par>
-        <p:cTn id="1" dur="indefinite" restart="never" nodeType="tmRoot">
-          <p:childTnLst>
-            <p:seq concurrent="1" nextAc="seek">
-              <p:cTn id="2" dur="indefinite" nodeType="mainSeq">
-                <p:childTnLst>
-                  <p:par>
-                    <p:cTn id="3" fill="hold">
-                      <p:stCondLst>
-                        <p:cond delay="indefinite"/>
-                      </p:stCondLst>
-                      <p:childTnLst>
-                        <p:par>
-                          <p:cTn id="4" fill="hold">
-                            <p:stCondLst>
-                              <p:cond delay="0"/>
-                            </p:stCondLst>
-                            <p:childTnLst>
-                              <p:par>
-                                <p:cTn id="5" presetID="10" presetClass="entr" presetSubtype="0" fill="hold" grpId="0" nodeType="clickEffect">
-                                  <p:stCondLst>
-                                    <p:cond delay="0"/>
-                                  </p:stCondLst>
-                                  <p:childTnLst>
-                                    <p:set>
-                                      <p:cBhvr>
-                                        <p:cTn id="6" dur="1" fill="hold">
-                                          <p:stCondLst>
-                                            <p:cond delay="0"/>
-                                          </p:stCondLst>
-                                        </p:cTn>
-                                        <p:tgtEl>
-                                          <p:spTgt spid="35"/>
-                                        </p:tgtEl>
-                                        <p:attrNameLst>
-                                          <p:attrName>style.visibility</p:attrName>
-                                        </p:attrNameLst>
-                                      </p:cBhvr>
-                                      <p:to>
-                                        <p:strVal val="visible"/>
-                                      </p:to>
-                                    </p:set>
-                                    <p:animEffect transition="in" filter="fade">
-                                      <p:cBhvr>
-                                        <p:cTn id="7" dur="500"/>
-                                        <p:tgtEl>
-                                          <p:spTgt spid="35"/>
-                                        </p:tgtEl>
-                                      </p:cBhvr>
-                                    </p:animEffect>
-                                  </p:childTnLst>
-                                </p:cTn>
-                              </p:par>
-                            </p:childTnLst>
-                          </p:cTn>
-                        </p:par>
-                      </p:childTnLst>
-                    </p:cTn>
-                  </p:par>
-                </p:childTnLst>
-              </p:cTn>
-              <p:prevCondLst>
-                <p:cond evt="onPrev" delay="0">
-                  <p:tgtEl>
-                    <p:sldTgt/>
-                  </p:tgtEl>
-                </p:cond>
-              </p:prevCondLst>
-              <p:nextCondLst>
-                <p:cond evt="onNext" delay="0">
-                  <p:tgtEl>
-                    <p:sldTgt/>
-                  </p:tgtEl>
-                </p:cond>
-              </p:nextCondLst>
-            </p:seq>
-          </p:childTnLst>
-        </p:cTn>
-      </p:par>
-    </p:tnLst>
-    <p:bldLst>
-      <p:bldP spid="35" grpId="0"/>
-    </p:bldLst>
-  </p:timing>
-</p:sld>
-</file>
-
-<file path=ppt/slides/slide6.xml><?xml version="1.0" encoding="utf-8"?>
-<p:sld xmlns:a="http://schemas.openxmlformats.org/drawingml/2006/main" xmlns:r="http://schemas.openxmlformats.org/officeDocument/2006/relationships" xmlns:p="http://schemas.openxmlformats.org/presentationml/2006/main">
-  <p:cSld>
-    <p:spTree>
-      <p:nvGrpSpPr>
-        <p:cNvPr id="1" name=""/>
-        <p:cNvGrpSpPr/>
-        <p:nvPr/>
-      </p:nvGrpSpPr>
-      <p:grpSpPr>
-        <a:xfrm>
-          <a:off x="0" y="0"/>
-          <a:ext cx="0" cy="0"/>
-          <a:chOff x="0" y="0"/>
-          <a:chExt cx="0" cy="0"/>
-        </a:xfrm>
-      </p:grpSpPr>
-      <p:sp>
-        <p:nvSpPr>
-          <p:cNvPr id="2" name="Title 1">
-            <a:extLst>
-              <a:ext uri="{FF2B5EF4-FFF2-40B4-BE49-F238E27FC236}">
-                <a16:creationId xmlns:a16="http://schemas.microsoft.com/office/drawing/2014/main" id="{0A39B26F-5187-4B71-D442-12D260D7EF6A}"/>
-              </a:ext>
-            </a:extLst>
-          </p:cNvPr>
-          <p:cNvSpPr>
-            <a:spLocks noGrp="1"/>
-          </p:cNvSpPr>
-          <p:nvPr>
-            <p:ph type="title"/>
-          </p:nvPr>
-        </p:nvSpPr>
-        <p:spPr/>
-        <p:txBody>
-          <a:bodyPr/>
-          <a:lstStyle/>
-          <a:p>
-            <a:r>
-              <a:rPr lang="en-AT" dirty="0"/>
-              <a:t>Results</a:t>
-            </a:r>
-            <a:endParaRPr lang="en-US" dirty="0"/>
-          </a:p>
-        </p:txBody>
-      </p:sp>
-      <p:sp>
-        <p:nvSpPr>
-          <p:cNvPr id="4" name="Slide Number Placeholder 3">
-            <a:extLst>
-              <a:ext uri="{FF2B5EF4-FFF2-40B4-BE49-F238E27FC236}">
-                <a16:creationId xmlns:a16="http://schemas.microsoft.com/office/drawing/2014/main" id="{7658BEF0-F774-4A14-846F-7ADB9625F36B}"/>
-              </a:ext>
-            </a:extLst>
-          </p:cNvPr>
-          <p:cNvSpPr>
-            <a:spLocks noGrp="1"/>
-          </p:cNvSpPr>
-          <p:nvPr>
-            <p:ph type="sldNum" sz="quarter" idx="12"/>
-          </p:nvPr>
-        </p:nvSpPr>
-        <p:spPr/>
-        <p:txBody>
-          <a:bodyPr/>
-          <a:lstStyle/>
-          <a:p>
-            <a:fld id="{4B64EC4D-37E3-EF42-B9AB-6337577588CB}" type="slidenum">
-              <a:rPr lang="de-DE" smtClean="0"/>
-              <a:t>6</a:t>
-            </a:fld>
-            <a:endParaRPr lang="de-DE" dirty="0"/>
-          </a:p>
-        </p:txBody>
-      </p:sp>
-      <p:sp>
-        <p:nvSpPr>
-          <p:cNvPr id="3" name="TextBox 2">
-            <a:extLst>
-              <a:ext uri="{FF2B5EF4-FFF2-40B4-BE49-F238E27FC236}">
-                <a16:creationId xmlns:a16="http://schemas.microsoft.com/office/drawing/2014/main" id="{6EF3D63B-0AD4-EB4C-E6A2-26CF7307089E}"/>
-              </a:ext>
-            </a:extLst>
-          </p:cNvPr>
-          <p:cNvSpPr txBox="1"/>
-          <p:nvPr/>
-        </p:nvSpPr>
-        <p:spPr>
-          <a:xfrm>
-            <a:off x="1545544" y="2273080"/>
-            <a:ext cx="4600075" cy="369332"/>
-          </a:xfrm>
-          <a:prstGeom prst="rect">
-            <a:avLst/>
-          </a:prstGeom>
-          <a:noFill/>
-        </p:spPr>
-        <p:txBody>
-          <a:bodyPr wrap="square" lIns="0" rtlCol="0">
-            <a:spAutoFit/>
-          </a:bodyPr>
-          <a:lstStyle/>
-          <a:p>
-            <a:r>
-              <a:rPr lang="en-AT" sz="1800" b="1" dirty="0"/>
-              <a:t>Shortest paths</a:t>
-            </a:r>
-            <a:endParaRPr lang="bs-Latn-BA" sz="1800" b="1" dirty="0"/>
-          </a:p>
-        </p:txBody>
-      </p:sp>
-      <p:sp>
-        <p:nvSpPr>
-          <p:cNvPr id="12" name="TextBox 11">
-            <a:extLst>
-              <a:ext uri="{FF2B5EF4-FFF2-40B4-BE49-F238E27FC236}">
-                <a16:creationId xmlns:a16="http://schemas.microsoft.com/office/drawing/2014/main" id="{6353C1FB-8A2E-23A8-01AC-72317A7C237C}"/>
-              </a:ext>
-            </a:extLst>
-          </p:cNvPr>
-          <p:cNvSpPr txBox="1"/>
-          <p:nvPr/>
-        </p:nvSpPr>
-        <p:spPr>
-          <a:xfrm>
-            <a:off x="6792506" y="2273080"/>
-            <a:ext cx="4600075" cy="369332"/>
-          </a:xfrm>
-          <a:prstGeom prst="rect">
-            <a:avLst/>
-          </a:prstGeom>
-          <a:noFill/>
-        </p:spPr>
-        <p:txBody>
-          <a:bodyPr wrap="square" lIns="0" rtlCol="0">
-            <a:spAutoFit/>
-          </a:bodyPr>
-          <a:lstStyle/>
-          <a:p>
-            <a:r>
-              <a:rPr lang="en-AT" sz="1800" b="1" dirty="0"/>
+            <a:r>
+              <a:rPr lang="en-AT" sz="2000" b="1" dirty="0"/>
               <a:t>Highways</a:t>
             </a:r>
-            <a:endParaRPr lang="bs-Latn-BA" sz="1800" b="1" dirty="0"/>
+            <a:endParaRPr lang="bs-Latn-BA" sz="2000" b="1" dirty="0"/>
           </a:p>
         </p:txBody>
       </p:sp>
@@ -4673,7 +4157,7 @@
         <p:spPr>
           <a:xfrm>
             <a:off x="1545544" y="2717867"/>
-            <a:ext cx="4600075" cy="338554"/>
+            <a:ext cx="4600075" cy="369332"/>
           </a:xfrm>
           <a:prstGeom prst="rect">
             <a:avLst/>
@@ -4687,18 +4171,18 @@
           <a:lstStyle/>
           <a:p>
             <a:r>
-              <a:rPr lang="bs-Latn-BA" sz="1600" dirty="0"/>
+              <a:rPr lang="bs-Latn-BA" sz="1800" dirty="0"/>
               <a:t>A</a:t>
             </a:r>
             <a:r>
-              <a:rPr lang="en-AT" sz="1600" dirty="0" err="1"/>
+              <a:rPr lang="en-AT" sz="1800" dirty="0" err="1"/>
               <a:t>verage</a:t>
             </a:r>
             <a:r>
-              <a:rPr lang="en-AT" sz="1600" dirty="0"/>
+              <a:rPr lang="en-AT" sz="1800" dirty="0"/>
               <a:t> shortest path = 40.69</a:t>
             </a:r>
-            <a:endParaRPr lang="bs-Latn-BA" sz="1600" dirty="0"/>
+            <a:endParaRPr lang="bs-Latn-BA" sz="1800" dirty="0"/>
           </a:p>
         </p:txBody>
       </p:sp>
@@ -4717,7 +4201,7 @@
         <p:spPr>
           <a:xfrm>
             <a:off x="6792506" y="2717867"/>
-            <a:ext cx="4600075" cy="338554"/>
+            <a:ext cx="4600075" cy="369332"/>
           </a:xfrm>
           <a:prstGeom prst="rect">
             <a:avLst/>
@@ -4731,10 +4215,10 @@
           <a:lstStyle/>
           <a:p>
             <a:r>
-              <a:rPr lang="en-AT" sz="1600" dirty="0"/>
+              <a:rPr lang="en-AT" sz="1800" dirty="0"/>
               <a:t>Average shortest path = 31.05</a:t>
             </a:r>
-            <a:endParaRPr lang="bs-Latn-BA" sz="1600" dirty="0"/>
+            <a:endParaRPr lang="bs-Latn-BA" sz="1800" dirty="0"/>
           </a:p>
         </p:txBody>
       </p:sp>
@@ -4891,7 +4375,7 @@
         <p:spPr>
           <a:xfrm>
             <a:off x="1545544" y="1591671"/>
-            <a:ext cx="11038143" cy="338554"/>
+            <a:ext cx="11038143" cy="369332"/>
           </a:xfrm>
           <a:prstGeom prst="rect">
             <a:avLst/>
@@ -4905,10 +4389,10 @@
           <a:lstStyle/>
           <a:p>
             <a:r>
-              <a:rPr lang="en-AT" sz="1600" dirty="0"/>
+              <a:rPr lang="en-AT" sz="1800" dirty="0"/>
               <a:t>The shortest path is one with the least number of edges in it</a:t>
             </a:r>
-            <a:endParaRPr lang="bs-Latn-BA" sz="1600" dirty="0"/>
+            <a:endParaRPr lang="bs-Latn-BA" sz="1800" dirty="0"/>
           </a:p>
         </p:txBody>
       </p:sp>
@@ -4958,13 +4442,13 @@
   <p:clrMapOvr>
     <a:masterClrMapping/>
   </p:clrMapOvr>
-  <mc:AlternateContent xmlns:mc="http://schemas.openxmlformats.org/markup-compatibility/2006">
-    <mc:Choice xmlns:p159="http://schemas.microsoft.com/office/powerpoint/2015/09/main" Requires="p159">
+  <mc:AlternateContent xmlns:mc="http://schemas.openxmlformats.org/markup-compatibility/2006" xmlns:p159="http://schemas.microsoft.com/office/powerpoint/2015/09/main">
+    <mc:Choice Requires="p159">
       <p:transition xmlns:p14="http://schemas.microsoft.com/office/powerpoint/2010/main" spd="slow" p14:dur="2000">
         <p159:morph option="byObject"/>
       </p:transition>
     </mc:Choice>
-    <mc:Fallback>
+    <mc:Fallback xmlns="">
       <p:transition spd="slow">
         <p:fade/>
       </p:transition>
@@ -5130,7 +4614,7 @@
 </p:sld>
 </file>
 
-<file path=ppt/slides/slide7.xml><?xml version="1.0" encoding="utf-8"?>
+<file path=ppt/slides/slide6.xml><?xml version="1.0" encoding="utf-8"?>
 <p:sld xmlns:a="http://schemas.openxmlformats.org/drawingml/2006/main" xmlns:r="http://schemas.openxmlformats.org/officeDocument/2006/relationships" xmlns:p="http://schemas.openxmlformats.org/presentationml/2006/main">
   <p:cSld>
     <p:spTree>
@@ -5220,7 +4704,7 @@
         <p:spPr>
           <a:xfrm>
             <a:off x="1545544" y="2273080"/>
-            <a:ext cx="4600075" cy="369332"/>
+            <a:ext cx="4600075" cy="400110"/>
           </a:xfrm>
           <a:prstGeom prst="rect">
             <a:avLst/>
@@ -5234,10 +4718,10 @@
           <a:lstStyle/>
           <a:p>
             <a:r>
-              <a:rPr lang="en-AT" sz="1800" b="1" dirty="0"/>
+              <a:rPr lang="en-AT" sz="2000" b="1" dirty="0"/>
               <a:t>Shortest paths</a:t>
             </a:r>
-            <a:endParaRPr lang="bs-Latn-BA" sz="1800" b="1" dirty="0"/>
+            <a:endParaRPr lang="bs-Latn-BA" sz="2000" b="1" dirty="0"/>
           </a:p>
         </p:txBody>
       </p:sp>
@@ -5256,7 +4740,7 @@
         <p:spPr>
           <a:xfrm>
             <a:off x="6792506" y="2273080"/>
-            <a:ext cx="4600075" cy="369332"/>
+            <a:ext cx="4600075" cy="400110"/>
           </a:xfrm>
           <a:prstGeom prst="rect">
             <a:avLst/>
@@ -5270,10 +4754,10 @@
           <a:lstStyle/>
           <a:p>
             <a:r>
-              <a:rPr lang="en-AT" sz="1800" b="1" dirty="0"/>
+              <a:rPr lang="en-AT" sz="2000" b="1" dirty="0"/>
               <a:t>Highways</a:t>
             </a:r>
-            <a:endParaRPr lang="bs-Latn-BA" sz="1800" b="1" dirty="0"/>
+            <a:endParaRPr lang="bs-Latn-BA" sz="2000" b="1" dirty="0"/>
           </a:p>
         </p:txBody>
       </p:sp>
@@ -5350,7 +4834,7 @@
         <p:spPr>
           <a:xfrm>
             <a:off x="1545544" y="2717867"/>
-            <a:ext cx="4600075" cy="338554"/>
+            <a:ext cx="4600075" cy="369332"/>
           </a:xfrm>
           <a:prstGeom prst="rect">
             <a:avLst/>
@@ -5364,18 +4848,18 @@
           <a:lstStyle/>
           <a:p>
             <a:r>
-              <a:rPr lang="bs-Latn-BA" sz="1600" dirty="0"/>
+              <a:rPr lang="bs-Latn-BA" sz="1800" dirty="0"/>
               <a:t>A</a:t>
             </a:r>
             <a:r>
-              <a:rPr lang="en-AT" sz="1600" dirty="0" err="1"/>
+              <a:rPr lang="en-AT" sz="1800" dirty="0" err="1"/>
               <a:t>verage</a:t>
             </a:r>
             <a:r>
-              <a:rPr lang="en-AT" sz="1600" dirty="0"/>
+              <a:rPr lang="en-AT" sz="1800" dirty="0"/>
               <a:t> shortest path = 4667.39</a:t>
             </a:r>
-            <a:endParaRPr lang="bs-Latn-BA" sz="1600" dirty="0"/>
+            <a:endParaRPr lang="bs-Latn-BA" sz="1800" dirty="0"/>
           </a:p>
         </p:txBody>
       </p:sp>
@@ -5394,7 +4878,7 @@
         <p:spPr>
           <a:xfrm>
             <a:off x="6792506" y="2717867"/>
-            <a:ext cx="4600075" cy="338554"/>
+            <a:ext cx="4600075" cy="369332"/>
           </a:xfrm>
           <a:prstGeom prst="rect">
             <a:avLst/>
@@ -5408,10 +4892,10 @@
           <a:lstStyle/>
           <a:p>
             <a:r>
-              <a:rPr lang="en-AT" sz="1600" dirty="0"/>
+              <a:rPr lang="en-AT" sz="1800" dirty="0"/>
               <a:t>Average shortest path = 3538.07</a:t>
             </a:r>
-            <a:endParaRPr lang="bs-Latn-BA" sz="1600" dirty="0"/>
+            <a:endParaRPr lang="bs-Latn-BA" sz="1800" dirty="0"/>
           </a:p>
         </p:txBody>
       </p:sp>
@@ -5568,7 +5052,7 @@
         <p:spPr>
           <a:xfrm>
             <a:off x="1545544" y="1591671"/>
-            <a:ext cx="11038143" cy="338554"/>
+            <a:ext cx="11038143" cy="369332"/>
           </a:xfrm>
           <a:prstGeom prst="rect">
             <a:avLst/>
@@ -5582,10 +5066,10 @@
           <a:lstStyle/>
           <a:p>
             <a:r>
-              <a:rPr lang="en-AT" sz="1600" dirty="0"/>
+              <a:rPr lang="en-AT" sz="1800" dirty="0"/>
               <a:t>The shortest path is one with the shortest length</a:t>
             </a:r>
-            <a:endParaRPr lang="bs-Latn-BA" sz="1600" dirty="0"/>
+            <a:endParaRPr lang="bs-Latn-BA" sz="1800" dirty="0"/>
           </a:p>
         </p:txBody>
       </p:sp>
@@ -5635,13 +5119,13 @@
   <p:clrMapOvr>
     <a:masterClrMapping/>
   </p:clrMapOvr>
-  <mc:AlternateContent xmlns:mc="http://schemas.openxmlformats.org/markup-compatibility/2006">
-    <mc:Choice xmlns:p159="http://schemas.microsoft.com/office/powerpoint/2015/09/main" Requires="p159">
+  <mc:AlternateContent xmlns:mc="http://schemas.openxmlformats.org/markup-compatibility/2006" xmlns:p159="http://schemas.microsoft.com/office/powerpoint/2015/09/main">
+    <mc:Choice Requires="p159">
       <p:transition xmlns:p14="http://schemas.microsoft.com/office/powerpoint/2010/main" spd="slow" p14:dur="2000">
         <p159:morph option="byObject"/>
       </p:transition>
     </mc:Choice>
-    <mc:Fallback>
+    <mc:Fallback xmlns="">
       <p:transition spd="slow">
         <p:fade/>
       </p:transition>
@@ -5650,7 +5134,7 @@
 </p:sld>
 </file>
 
-<file path=ppt/slides/slide8.xml><?xml version="1.0" encoding="utf-8"?>
+<file path=ppt/slides/slide7.xml><?xml version="1.0" encoding="utf-8"?>
 <p:sld xmlns:a="http://schemas.openxmlformats.org/drawingml/2006/main" xmlns:r="http://schemas.openxmlformats.org/officeDocument/2006/relationships" xmlns:p="http://schemas.openxmlformats.org/presentationml/2006/main">
   <p:cSld>
     <p:spTree>
@@ -6338,13 +5822,13 @@
   <p:clrMapOvr>
     <a:masterClrMapping/>
   </p:clrMapOvr>
-  <mc:AlternateContent xmlns:mc="http://schemas.openxmlformats.org/markup-compatibility/2006">
-    <mc:Choice xmlns:p159="http://schemas.microsoft.com/office/powerpoint/2015/09/main" Requires="p159">
+  <mc:AlternateContent xmlns:mc="http://schemas.openxmlformats.org/markup-compatibility/2006" xmlns:p159="http://schemas.microsoft.com/office/powerpoint/2015/09/main">
+    <mc:Choice Requires="p159">
       <p:transition xmlns:p14="http://schemas.microsoft.com/office/powerpoint/2010/main" spd="slow" p14:dur="2000">
         <p159:morph option="byObject"/>
       </p:transition>
     </mc:Choice>
-    <mc:Fallback>
+    <mc:Fallback xmlns="">
       <p:transition spd="slow">
         <p:fade/>
       </p:transition>

</xml_diff>

<commit_message>
update presentation and small changes to code
</commit_message>
<xml_diff>
--- a/presentation.pptx
+++ b/presentation.pptx
@@ -1147,14 +1147,14 @@
           </a:ln>
           <a:extLst>
             <a:ext uri="{909E8E84-426E-40dd-AFC4-6F175D3DCCD1}">
-              <a14:hiddenFill xmlns:a14="http://schemas.microsoft.com/office/drawing/2010/main" xmlns="">
+              <a14:hiddenFill xmlns="" xmlns:a14="http://schemas.microsoft.com/office/drawing/2010/main">
                 <a:solidFill>
                   <a:srgbClr val="FFFFFF"/>
                 </a:solidFill>
               </a14:hiddenFill>
             </a:ext>
             <a:ext uri="{91240B29-F687-4f45-9708-019B960494DF}">
-              <a14:hiddenLine xmlns:a14="http://schemas.microsoft.com/office/drawing/2010/main" xmlns="" w="9525">
+              <a14:hiddenLine xmlns="" xmlns:a14="http://schemas.microsoft.com/office/drawing/2010/main" w="9525">
                 <a:solidFill>
                   <a:srgbClr val="000000"/>
                 </a:solidFill>
@@ -3488,7 +3488,7 @@
         <p:spPr>
           <a:xfrm>
             <a:off x="1347424" y="1656037"/>
-            <a:ext cx="6179227" cy="4473019"/>
+            <a:ext cx="6179227" cy="4057521"/>
           </a:xfrm>
           <a:prstGeom prst="rect">
             <a:avLst/>
@@ -3502,8 +3502,8 @@
           <a:lstStyle/>
           <a:p>
             <a:r>
-              <a:rPr lang="en-AT" sz="1800" b="1" dirty="0"/>
-              <a:t>Algorithm</a:t>
+              <a:rPr lang="en-GB" sz="1800" b="1" dirty="0"/>
+              <a:t>General Approach</a:t>
             </a:r>
             <a:endParaRPr lang="bs-Latn-BA" sz="1800" b="1" dirty="0"/>
           </a:p>
@@ -3534,11 +3534,18 @@
               </a:rPr>
               <a:t>node pairs</a:t>
             </a:r>
-            <a:endParaRPr lang="en-GB" sz="1800" dirty="0">
-              <a:solidFill>
-                <a:srgbClr val="FF0000"/>
-              </a:solidFill>
-            </a:endParaRPr>
+            <a:r>
+              <a:rPr lang="en-GB" sz="1800" dirty="0">
+                <a:solidFill>
+                  <a:srgbClr val="FF0000"/>
+                </a:solidFill>
+              </a:rPr>
+              <a:t> </a:t>
+            </a:r>
+            <a:r>
+              <a:rPr lang="en-GB" sz="1800" dirty="0"/>
+              <a:t>(Euclidean)</a:t>
+            </a:r>
           </a:p>
           <a:p>
             <a:pPr marL="285750" indent="-285750">
@@ -3564,6 +3571,14 @@
               <a:rPr lang="en-AT" sz="1800" dirty="0"/>
               <a:t> between the pairs</a:t>
             </a:r>
+            <a:r>
+              <a:rPr lang="en-GB" sz="1800" dirty="0"/>
+              <a:t> (</a:t>
+            </a:r>
+            <a:r>
+              <a:rPr lang="en-GB" sz="1800" i="1" dirty="0"/>
+              <a:t>Dijkstra)</a:t>
+            </a:r>
             <a:endParaRPr lang="en-GB" sz="1800" dirty="0"/>
           </a:p>
           <a:p>
@@ -3594,7 +3609,7 @@
             </a:pPr>
             <a:r>
               <a:rPr lang="en-GB" sz="1800" dirty="0"/>
-              <a:t>Adapt their attributes to simulate highways</a:t>
+              <a:t>Adapt / add attributes to simulate highways</a:t>
             </a:r>
           </a:p>
           <a:p>
@@ -3630,7 +3645,7 @@
             </a:pPr>
             <a:r>
               <a:rPr lang="en-GB" sz="1800" dirty="0"/>
-              <a:t>Average shortest path (weights/ lengths)</a:t>
+              <a:t>Average shortest path</a:t>
             </a:r>
           </a:p>
           <a:p>
@@ -3645,20 +3660,6 @@
               <a:rPr lang="en-GB" sz="1800" dirty="0"/>
               <a:t>Graph resilience</a:t>
             </a:r>
-          </a:p>
-          <a:p>
-            <a:pPr marL="285750" indent="-285750">
-              <a:lnSpc>
-                <a:spcPct val="150000"/>
-              </a:lnSpc>
-              <a:buFont typeface="Wingdings" panose="05000000000000000000" pitchFamily="2" charset="2"/>
-              <a:buChar char="§"/>
-            </a:pPr>
-            <a:r>
-              <a:rPr lang="en-GB" sz="1800" dirty="0"/>
-              <a:t>Degree</a:t>
-            </a:r>
-            <a:endParaRPr lang="en-AT" sz="1800" dirty="0"/>
           </a:p>
         </p:txBody>
       </p:sp>

</xml_diff>